<commit_message>
Add MVC, MVP Pattern
</commit_message>
<xml_diff>
--- a/images/theory_analysis/MVC_MVP_Pattern/MVC_MVP_Pattern.pptx
+++ b/images/theory_analysis/MVC_MVP_Pattern/MVC_MVP_Pattern.pptx
@@ -216,7 +216,7 @@
           <a:p>
             <a:fld id="{6CD5550B-26C4-49A9-A5BA-636EF7BE6CE9}" type="datetimeFigureOut">
               <a:rPr lang="ko-KR" altLang="en-US" smtClean="0"/>
-              <a:t>2017-02-20</a:t>
+              <a:t>2017-03-14</a:t>
             </a:fld>
             <a:endParaRPr lang="ko-KR" altLang="en-US"/>
           </a:p>
@@ -1001,7 +1001,7 @@
           <a:p>
             <a:fld id="{FB30EDBD-1C2D-4C1E-B459-B60219FAB484}" type="datetimeFigureOut">
               <a:rPr lang="ko-KR" altLang="en-US" smtClean="0"/>
-              <a:t>2017-02-20</a:t>
+              <a:t>2017-03-14</a:t>
             </a:fld>
             <a:endParaRPr lang="ko-KR" altLang="en-US"/>
           </a:p>
@@ -1166,7 +1166,7 @@
           <a:p>
             <a:fld id="{FB30EDBD-1C2D-4C1E-B459-B60219FAB484}" type="datetimeFigureOut">
               <a:rPr lang="ko-KR" altLang="en-US" smtClean="0"/>
-              <a:t>2017-02-20</a:t>
+              <a:t>2017-03-14</a:t>
             </a:fld>
             <a:endParaRPr lang="ko-KR" altLang="en-US"/>
           </a:p>
@@ -1341,7 +1341,7 @@
           <a:p>
             <a:fld id="{FB30EDBD-1C2D-4C1E-B459-B60219FAB484}" type="datetimeFigureOut">
               <a:rPr lang="ko-KR" altLang="en-US" smtClean="0"/>
-              <a:t>2017-02-20</a:t>
+              <a:t>2017-03-14</a:t>
             </a:fld>
             <a:endParaRPr lang="ko-KR" altLang="en-US"/>
           </a:p>
@@ -1506,7 +1506,7 @@
           <a:p>
             <a:fld id="{FB30EDBD-1C2D-4C1E-B459-B60219FAB484}" type="datetimeFigureOut">
               <a:rPr lang="ko-KR" altLang="en-US" smtClean="0"/>
-              <a:t>2017-02-20</a:t>
+              <a:t>2017-03-14</a:t>
             </a:fld>
             <a:endParaRPr lang="ko-KR" altLang="en-US"/>
           </a:p>
@@ -1754,7 +1754,7 @@
           <a:p>
             <a:fld id="{FB30EDBD-1C2D-4C1E-B459-B60219FAB484}" type="datetimeFigureOut">
               <a:rPr lang="ko-KR" altLang="en-US" smtClean="0"/>
-              <a:t>2017-02-20</a:t>
+              <a:t>2017-03-14</a:t>
             </a:fld>
             <a:endParaRPr lang="ko-KR" altLang="en-US"/>
           </a:p>
@@ -2037,7 +2037,7 @@
           <a:p>
             <a:fld id="{FB30EDBD-1C2D-4C1E-B459-B60219FAB484}" type="datetimeFigureOut">
               <a:rPr lang="ko-KR" altLang="en-US" smtClean="0"/>
-              <a:t>2017-02-20</a:t>
+              <a:t>2017-03-14</a:t>
             </a:fld>
             <a:endParaRPr lang="ko-KR" altLang="en-US"/>
           </a:p>
@@ -2454,7 +2454,7 @@
           <a:p>
             <a:fld id="{FB30EDBD-1C2D-4C1E-B459-B60219FAB484}" type="datetimeFigureOut">
               <a:rPr lang="ko-KR" altLang="en-US" smtClean="0"/>
-              <a:t>2017-02-20</a:t>
+              <a:t>2017-03-14</a:t>
             </a:fld>
             <a:endParaRPr lang="ko-KR" altLang="en-US"/>
           </a:p>
@@ -2567,7 +2567,7 @@
           <a:p>
             <a:fld id="{FB30EDBD-1C2D-4C1E-B459-B60219FAB484}" type="datetimeFigureOut">
               <a:rPr lang="ko-KR" altLang="en-US" smtClean="0"/>
-              <a:t>2017-02-20</a:t>
+              <a:t>2017-03-14</a:t>
             </a:fld>
             <a:endParaRPr lang="ko-KR" altLang="en-US"/>
           </a:p>
@@ -2657,7 +2657,7 @@
           <a:p>
             <a:fld id="{FB30EDBD-1C2D-4C1E-B459-B60219FAB484}" type="datetimeFigureOut">
               <a:rPr lang="ko-KR" altLang="en-US" smtClean="0"/>
-              <a:t>2017-02-20</a:t>
+              <a:t>2017-03-14</a:t>
             </a:fld>
             <a:endParaRPr lang="ko-KR" altLang="en-US"/>
           </a:p>
@@ -2929,7 +2929,7 @@
           <a:p>
             <a:fld id="{FB30EDBD-1C2D-4C1E-B459-B60219FAB484}" type="datetimeFigureOut">
               <a:rPr lang="ko-KR" altLang="en-US" smtClean="0"/>
-              <a:t>2017-02-20</a:t>
+              <a:t>2017-03-14</a:t>
             </a:fld>
             <a:endParaRPr lang="ko-KR" altLang="en-US"/>
           </a:p>
@@ -3177,7 +3177,7 @@
           <a:p>
             <a:fld id="{FB30EDBD-1C2D-4C1E-B459-B60219FAB484}" type="datetimeFigureOut">
               <a:rPr lang="ko-KR" altLang="en-US" smtClean="0"/>
-              <a:t>2017-02-20</a:t>
+              <a:t>2017-03-14</a:t>
             </a:fld>
             <a:endParaRPr lang="ko-KR" altLang="en-US"/>
           </a:p>
@@ -3385,7 +3385,7 @@
           <a:p>
             <a:fld id="{FB30EDBD-1C2D-4C1E-B459-B60219FAB484}" type="datetimeFigureOut">
               <a:rPr lang="ko-KR" altLang="en-US" smtClean="0"/>
-              <a:t>2017-02-20</a:t>
+              <a:t>2017-03-14</a:t>
             </a:fld>
             <a:endParaRPr lang="ko-KR" altLang="en-US"/>
           </a:p>
@@ -3781,11 +3781,7 @@
             </a:r>
             <a:r>
               <a:rPr lang="en-US" altLang="ko-KR" dirty="0" smtClean="0"/>
-              <a:t> </a:t>
-            </a:r>
-            <a:r>
-              <a:rPr lang="en-US" altLang="ko-KR" dirty="0" smtClean="0"/>
-              <a:t>Pattern</a:t>
+              <a:t> Pattern</a:t>
             </a:r>
             <a:endParaRPr lang="ko-KR" altLang="en-US" dirty="0"/>
           </a:p>
@@ -3799,7 +3795,7 @@
         </p:nvSpPr>
         <p:spPr>
           <a:xfrm>
-            <a:off x="3779912" y="3867894"/>
+            <a:off x="5283138" y="3534550"/>
             <a:ext cx="1872208" cy="936104"/>
           </a:xfrm>
           <a:prstGeom prst="roundRect">
@@ -3837,13 +3833,13 @@
       </p:sp>
       <p:sp>
         <p:nvSpPr>
-          <p:cNvPr id="22" name="모서리가 둥근 직사각형 21"/>
+          <p:cNvPr id="23" name="모서리가 둥근 직사각형 22"/>
           <p:cNvSpPr/>
           <p:nvPr/>
         </p:nvSpPr>
         <p:spPr>
           <a:xfrm>
-            <a:off x="3923928" y="1131590"/>
+            <a:off x="2816250" y="2310414"/>
             <a:ext cx="1872208" cy="936104"/>
           </a:xfrm>
           <a:prstGeom prst="roundRect">
@@ -3873,7 +3869,7 @@
             <a:pPr algn="ctr"/>
             <a:r>
               <a:rPr lang="en-US" altLang="ko-KR" dirty="0" smtClean="0"/>
-              <a:t>View</a:t>
+              <a:t>Controller</a:t>
             </a:r>
             <a:endParaRPr lang="ko-KR" altLang="en-US" dirty="0"/>
           </a:p>
@@ -3881,13 +3877,13 @@
       </p:sp>
       <p:sp>
         <p:nvSpPr>
-          <p:cNvPr id="23" name="모서리가 둥근 직사각형 22"/>
+          <p:cNvPr id="29" name="모서리가 둥근 직사각형 28"/>
           <p:cNvSpPr/>
           <p:nvPr/>
         </p:nvSpPr>
         <p:spPr>
           <a:xfrm>
-            <a:off x="1187624" y="2715766"/>
+            <a:off x="5283138" y="1059582"/>
             <a:ext cx="1872208" cy="936104"/>
           </a:xfrm>
           <a:prstGeom prst="roundRect">
@@ -3917,7 +3913,7 @@
             <a:pPr algn="ctr"/>
             <a:r>
               <a:rPr lang="en-US" altLang="ko-KR" dirty="0" smtClean="0"/>
-              <a:t>Controller</a:t>
+              <a:t>View</a:t>
             </a:r>
             <a:endParaRPr lang="ko-KR" altLang="en-US" dirty="0"/>
           </a:p>
@@ -3925,14 +3921,554 @@
       </p:sp>
       <p:sp>
         <p:nvSpPr>
-          <p:cNvPr id="26" name="모서리가 둥근 직사각형 25"/>
+          <p:cNvPr id="52" name="자유형 51"/>
           <p:cNvSpPr/>
           <p:nvPr/>
         </p:nvSpPr>
         <p:spPr>
-          <a:xfrm>
-            <a:off x="3838572" y="1216946"/>
-            <a:ext cx="1872208" cy="936104"/>
+          <a:xfrm flipV="1">
+            <a:off x="3752354" y="3246518"/>
+            <a:ext cx="1530784" cy="756084"/>
+          </a:xfrm>
+          <a:custGeom>
+            <a:avLst/>
+            <a:gdLst>
+              <a:gd name="connsiteX0" fmla="*/ 1127982 w 1127982"/>
+              <a:gd name="connsiteY0" fmla="*/ 0 h 1014517"/>
+              <a:gd name="connsiteX1" fmla="*/ 0 w 1127982"/>
+              <a:gd name="connsiteY1" fmla="*/ 0 h 1014517"/>
+              <a:gd name="connsiteX2" fmla="*/ 0 w 1127982"/>
+              <a:gd name="connsiteY2" fmla="*/ 1014517 h 1014517"/>
+            </a:gdLst>
+            <a:ahLst/>
+            <a:cxnLst>
+              <a:cxn ang="0">
+                <a:pos x="connsiteX0" y="connsiteY0"/>
+              </a:cxn>
+              <a:cxn ang="0">
+                <a:pos x="connsiteX1" y="connsiteY1"/>
+              </a:cxn>
+              <a:cxn ang="0">
+                <a:pos x="connsiteX2" y="connsiteY2"/>
+              </a:cxn>
+            </a:cxnLst>
+            <a:rect l="l" t="t" r="r" b="b"/>
+            <a:pathLst>
+              <a:path w="1127982" h="1014517">
+                <a:moveTo>
+                  <a:pt x="1127982" y="0"/>
+                </a:moveTo>
+                <a:lnTo>
+                  <a:pt x="0" y="0"/>
+                </a:lnTo>
+                <a:lnTo>
+                  <a:pt x="0" y="1014517"/>
+                </a:lnTo>
+              </a:path>
+            </a:pathLst>
+          </a:custGeom>
+          <a:ln w="28575">
+            <a:solidFill>
+              <a:schemeClr val="tx1"/>
+            </a:solidFill>
+            <a:headEnd type="arrow" w="med" len="med"/>
+            <a:tailEnd type="none" w="med" len="med"/>
+          </a:ln>
+        </p:spPr>
+        <p:style>
+          <a:lnRef idx="1">
+            <a:schemeClr val="accent1"/>
+          </a:lnRef>
+          <a:fillRef idx="0">
+            <a:schemeClr val="accent1"/>
+          </a:fillRef>
+          <a:effectRef idx="0">
+            <a:schemeClr val="accent1"/>
+          </a:effectRef>
+          <a:fontRef idx="minor">
+            <a:schemeClr val="tx1"/>
+          </a:fontRef>
+        </p:style>
+        <p:txBody>
+          <a:bodyPr rtlCol="0" anchor="ctr"/>
+          <a:lstStyle/>
+          <a:p>
+            <a:pPr algn="ctr"/>
+            <a:endParaRPr lang="ko-KR" altLang="en-US"/>
+          </a:p>
+        </p:txBody>
+      </p:sp>
+      <p:cxnSp>
+        <p:nvCxnSpPr>
+          <p:cNvPr id="53" name="직선 화살표 연결선 52"/>
+          <p:cNvCxnSpPr>
+            <a:endCxn id="29" idx="2"/>
+          </p:cNvCxnSpPr>
+          <p:nvPr/>
+        </p:nvCxnSpPr>
+        <p:spPr>
+          <a:xfrm flipV="1">
+            <a:off x="6219242" y="1995686"/>
+            <a:ext cx="0" cy="1538864"/>
+          </a:xfrm>
+          <a:prstGeom prst="straightConnector1">
+            <a:avLst/>
+          </a:prstGeom>
+          <a:ln w="28575">
+            <a:solidFill>
+              <a:schemeClr val="tx1"/>
+            </a:solidFill>
+            <a:tailEnd type="arrow"/>
+          </a:ln>
+        </p:spPr>
+        <p:style>
+          <a:lnRef idx="1">
+            <a:schemeClr val="accent1"/>
+          </a:lnRef>
+          <a:fillRef idx="0">
+            <a:schemeClr val="accent1"/>
+          </a:fillRef>
+          <a:effectRef idx="0">
+            <a:schemeClr val="accent1"/>
+          </a:effectRef>
+          <a:fontRef idx="minor">
+            <a:schemeClr val="tx1"/>
+          </a:fontRef>
+        </p:style>
+      </p:cxnSp>
+      <p:sp>
+        <p:nvSpPr>
+          <p:cNvPr id="57" name="모서리가 둥근 직사각형 56"/>
+          <p:cNvSpPr/>
+          <p:nvPr/>
+        </p:nvSpPr>
+        <p:spPr>
+          <a:xfrm>
+            <a:off x="3426222" y="1211194"/>
+            <a:ext cx="2082441" cy="307132"/>
+          </a:xfrm>
+          <a:prstGeom prst="roundRect">
+            <a:avLst>
+              <a:gd name="adj" fmla="val 18148"/>
+            </a:avLst>
+          </a:prstGeom>
+          <a:noFill/>
+          <a:ln>
+            <a:noFill/>
+          </a:ln>
+        </p:spPr>
+        <p:style>
+          <a:lnRef idx="2">
+            <a:schemeClr val="dk1"/>
+          </a:lnRef>
+          <a:fillRef idx="1">
+            <a:schemeClr val="lt1"/>
+          </a:fillRef>
+          <a:effectRef idx="0">
+            <a:schemeClr val="dk1"/>
+          </a:effectRef>
+          <a:fontRef idx="minor">
+            <a:schemeClr val="dk1"/>
+          </a:fontRef>
+        </p:style>
+        <p:txBody>
+          <a:bodyPr rtlCol="0" anchor="ctr"/>
+          <a:lstStyle/>
+          <a:p>
+            <a:pPr algn="ctr"/>
+            <a:r>
+              <a:rPr lang="en-US" altLang="ko-KR" sz="1400" b="1" dirty="0" smtClean="0"/>
+              <a:t>Update UI</a:t>
+            </a:r>
+          </a:p>
+        </p:txBody>
+      </p:sp>
+      <p:sp>
+        <p:nvSpPr>
+          <p:cNvPr id="58" name="모서리가 둥근 직사각형 57"/>
+          <p:cNvSpPr/>
+          <p:nvPr/>
+        </p:nvSpPr>
+        <p:spPr>
+          <a:xfrm>
+            <a:off x="3504021" y="4019506"/>
+            <a:ext cx="2082441" cy="307132"/>
+          </a:xfrm>
+          <a:prstGeom prst="roundRect">
+            <a:avLst>
+              <a:gd name="adj" fmla="val 18148"/>
+            </a:avLst>
+          </a:prstGeom>
+          <a:noFill/>
+          <a:ln>
+            <a:noFill/>
+          </a:ln>
+        </p:spPr>
+        <p:style>
+          <a:lnRef idx="2">
+            <a:schemeClr val="dk1"/>
+          </a:lnRef>
+          <a:fillRef idx="1">
+            <a:schemeClr val="lt1"/>
+          </a:fillRef>
+          <a:effectRef idx="0">
+            <a:schemeClr val="dk1"/>
+          </a:effectRef>
+          <a:fontRef idx="minor">
+            <a:schemeClr val="dk1"/>
+          </a:fontRef>
+        </p:style>
+        <p:txBody>
+          <a:bodyPr rtlCol="0" anchor="ctr"/>
+          <a:lstStyle/>
+          <a:p>
+            <a:pPr algn="ctr"/>
+            <a:r>
+              <a:rPr lang="en-US" altLang="ko-KR" sz="1400" b="1" dirty="0" smtClean="0"/>
+              <a:t>Update Data</a:t>
+            </a:r>
+          </a:p>
+        </p:txBody>
+      </p:sp>
+      <p:sp>
+        <p:nvSpPr>
+          <p:cNvPr id="59" name="모서리가 둥근 직사각형 58"/>
+          <p:cNvSpPr/>
+          <p:nvPr/>
+        </p:nvSpPr>
+        <p:spPr>
+          <a:xfrm>
+            <a:off x="5729919" y="2632304"/>
+            <a:ext cx="2082441" cy="307132"/>
+          </a:xfrm>
+          <a:prstGeom prst="roundRect">
+            <a:avLst>
+              <a:gd name="adj" fmla="val 18148"/>
+            </a:avLst>
+          </a:prstGeom>
+          <a:noFill/>
+          <a:ln>
+            <a:noFill/>
+          </a:ln>
+        </p:spPr>
+        <p:style>
+          <a:lnRef idx="2">
+            <a:schemeClr val="dk1"/>
+          </a:lnRef>
+          <a:fillRef idx="1">
+            <a:schemeClr val="lt1"/>
+          </a:fillRef>
+          <a:effectRef idx="0">
+            <a:schemeClr val="dk1"/>
+          </a:effectRef>
+          <a:fontRef idx="minor">
+            <a:schemeClr val="dk1"/>
+          </a:fontRef>
+        </p:style>
+        <p:txBody>
+          <a:bodyPr rtlCol="0" anchor="ctr"/>
+          <a:lstStyle/>
+          <a:p>
+            <a:pPr algn="ctr"/>
+            <a:r>
+              <a:rPr lang="en-US" altLang="ko-KR" sz="1400" b="1" dirty="0" smtClean="0"/>
+              <a:t>Update UI</a:t>
+            </a:r>
+          </a:p>
+        </p:txBody>
+      </p:sp>
+      <p:cxnSp>
+        <p:nvCxnSpPr>
+          <p:cNvPr id="60" name="직선 화살표 연결선 59"/>
+          <p:cNvCxnSpPr>
+            <a:stCxn id="23" idx="1"/>
+          </p:cNvCxnSpPr>
+          <p:nvPr/>
+        </p:nvCxnSpPr>
+        <p:spPr>
+          <a:xfrm flipH="1">
+            <a:off x="1265982" y="2778466"/>
+            <a:ext cx="1550268" cy="0"/>
+          </a:xfrm>
+          <a:prstGeom prst="straightConnector1">
+            <a:avLst/>
+          </a:prstGeom>
+          <a:ln w="28575">
+            <a:solidFill>
+              <a:schemeClr val="tx1"/>
+            </a:solidFill>
+            <a:headEnd type="arrow" w="med" len="med"/>
+            <a:tailEnd type="none" w="med" len="med"/>
+          </a:ln>
+        </p:spPr>
+        <p:style>
+          <a:lnRef idx="1">
+            <a:schemeClr val="accent1"/>
+          </a:lnRef>
+          <a:fillRef idx="0">
+            <a:schemeClr val="accent1"/>
+          </a:fillRef>
+          <a:effectRef idx="0">
+            <a:schemeClr val="accent1"/>
+          </a:effectRef>
+          <a:fontRef idx="minor">
+            <a:schemeClr val="tx1"/>
+          </a:fontRef>
+        </p:style>
+      </p:cxnSp>
+      <p:sp>
+        <p:nvSpPr>
+          <p:cNvPr id="61" name="모서리가 둥근 직사각형 60"/>
+          <p:cNvSpPr/>
+          <p:nvPr/>
+        </p:nvSpPr>
+        <p:spPr>
+          <a:xfrm>
+            <a:off x="977950" y="2454430"/>
+            <a:ext cx="2082441" cy="307132"/>
+          </a:xfrm>
+          <a:prstGeom prst="roundRect">
+            <a:avLst>
+              <a:gd name="adj" fmla="val 18148"/>
+            </a:avLst>
+          </a:prstGeom>
+          <a:noFill/>
+          <a:ln>
+            <a:noFill/>
+          </a:ln>
+        </p:spPr>
+        <p:style>
+          <a:lnRef idx="2">
+            <a:schemeClr val="dk1"/>
+          </a:lnRef>
+          <a:fillRef idx="1">
+            <a:schemeClr val="lt1"/>
+          </a:fillRef>
+          <a:effectRef idx="0">
+            <a:schemeClr val="dk1"/>
+          </a:effectRef>
+          <a:fontRef idx="minor">
+            <a:schemeClr val="dk1"/>
+          </a:fontRef>
+        </p:style>
+        <p:txBody>
+          <a:bodyPr rtlCol="0" anchor="ctr"/>
+          <a:lstStyle/>
+          <a:p>
+            <a:pPr algn="ctr"/>
+            <a:r>
+              <a:rPr lang="en-US" altLang="ko-KR" sz="1400" b="1" dirty="0" smtClean="0"/>
+              <a:t>User Request</a:t>
+            </a:r>
+          </a:p>
+        </p:txBody>
+      </p:sp>
+      <p:sp>
+        <p:nvSpPr>
+          <p:cNvPr id="64" name="자유형 63"/>
+          <p:cNvSpPr/>
+          <p:nvPr/>
+        </p:nvSpPr>
+        <p:spPr>
+          <a:xfrm>
+            <a:off x="3752354" y="1527635"/>
+            <a:ext cx="1530784" cy="782780"/>
+          </a:xfrm>
+          <a:custGeom>
+            <a:avLst/>
+            <a:gdLst>
+              <a:gd name="connsiteX0" fmla="*/ 1127982 w 1127982"/>
+              <a:gd name="connsiteY0" fmla="*/ 0 h 1014517"/>
+              <a:gd name="connsiteX1" fmla="*/ 0 w 1127982"/>
+              <a:gd name="connsiteY1" fmla="*/ 0 h 1014517"/>
+              <a:gd name="connsiteX2" fmla="*/ 0 w 1127982"/>
+              <a:gd name="connsiteY2" fmla="*/ 1014517 h 1014517"/>
+            </a:gdLst>
+            <a:ahLst/>
+            <a:cxnLst>
+              <a:cxn ang="0">
+                <a:pos x="connsiteX0" y="connsiteY0"/>
+              </a:cxn>
+              <a:cxn ang="0">
+                <a:pos x="connsiteX1" y="connsiteY1"/>
+              </a:cxn>
+              <a:cxn ang="0">
+                <a:pos x="connsiteX2" y="connsiteY2"/>
+              </a:cxn>
+            </a:cxnLst>
+            <a:rect l="l" t="t" r="r" b="b"/>
+            <a:pathLst>
+              <a:path w="1127982" h="1014517">
+                <a:moveTo>
+                  <a:pt x="1127982" y="0"/>
+                </a:moveTo>
+                <a:lnTo>
+                  <a:pt x="0" y="0"/>
+                </a:lnTo>
+                <a:lnTo>
+                  <a:pt x="0" y="1014517"/>
+                </a:lnTo>
+              </a:path>
+            </a:pathLst>
+          </a:custGeom>
+          <a:ln w="28575">
+            <a:solidFill>
+              <a:schemeClr val="tx1"/>
+            </a:solidFill>
+            <a:headEnd type="arrow" w="med" len="med"/>
+            <a:tailEnd type="none" w="med" len="med"/>
+          </a:ln>
+        </p:spPr>
+        <p:style>
+          <a:lnRef idx="1">
+            <a:schemeClr val="accent1"/>
+          </a:lnRef>
+          <a:fillRef idx="0">
+            <a:schemeClr val="accent1"/>
+          </a:fillRef>
+          <a:effectRef idx="0">
+            <a:schemeClr val="accent1"/>
+          </a:effectRef>
+          <a:fontRef idx="minor">
+            <a:schemeClr val="tx1"/>
+          </a:fontRef>
+        </p:style>
+        <p:txBody>
+          <a:bodyPr rtlCol="0" anchor="ctr"/>
+          <a:lstStyle/>
+          <a:p>
+            <a:pPr algn="ctr"/>
+            <a:endParaRPr lang="ko-KR" altLang="en-US"/>
+          </a:p>
+        </p:txBody>
+      </p:sp>
+    </p:spTree>
+    <p:extLst>
+      <p:ext uri="{BB962C8B-B14F-4D97-AF65-F5344CB8AC3E}">
+        <p14:creationId xmlns:p14="http://schemas.microsoft.com/office/powerpoint/2010/main" val="4156384484"/>
+      </p:ext>
+    </p:extLst>
+  </p:cSld>
+  <p:clrMapOvr>
+    <a:masterClrMapping/>
+  </p:clrMapOvr>
+  <p:timing>
+    <p:tnLst>
+      <p:par>
+        <p:cTn id="1" dur="indefinite" restart="never" nodeType="tmRoot"/>
+      </p:par>
+    </p:tnLst>
+  </p:timing>
+</p:sld>
+</file>
+
+<file path=ppt/slides/slide2.xml><?xml version="1.0" encoding="utf-8"?>
+<p:sld xmlns:a="http://schemas.openxmlformats.org/drawingml/2006/main" xmlns:r="http://schemas.openxmlformats.org/officeDocument/2006/relationships" xmlns:p="http://schemas.openxmlformats.org/presentationml/2006/main">
+  <p:cSld>
+    <p:spTree>
+      <p:nvGrpSpPr>
+        <p:cNvPr id="1" name=""/>
+        <p:cNvGrpSpPr/>
+        <p:nvPr/>
+      </p:nvGrpSpPr>
+      <p:grpSpPr>
+        <a:xfrm>
+          <a:off x="0" y="0"/>
+          <a:ext cx="0" cy="0"/>
+          <a:chOff x="0" y="0"/>
+          <a:chExt cx="0" cy="0"/>
+        </a:xfrm>
+      </p:grpSpPr>
+      <p:sp>
+        <p:nvSpPr>
+          <p:cNvPr id="7" name="모서리가 둥근 직사각형 6"/>
+          <p:cNvSpPr/>
+          <p:nvPr/>
+        </p:nvSpPr>
+        <p:spPr>
+          <a:xfrm>
+            <a:off x="3131840" y="1059582"/>
+            <a:ext cx="2736304" cy="3456384"/>
+          </a:xfrm>
+          <a:prstGeom prst="roundRect">
+            <a:avLst>
+              <a:gd name="adj" fmla="val 3964"/>
+            </a:avLst>
+          </a:prstGeom>
+        </p:spPr>
+        <p:style>
+          <a:lnRef idx="2">
+            <a:schemeClr val="dk1"/>
+          </a:lnRef>
+          <a:fillRef idx="1">
+            <a:schemeClr val="lt1"/>
+          </a:fillRef>
+          <a:effectRef idx="0">
+            <a:schemeClr val="dk1"/>
+          </a:effectRef>
+          <a:fontRef idx="minor">
+            <a:schemeClr val="dk1"/>
+          </a:fontRef>
+        </p:style>
+        <p:txBody>
+          <a:bodyPr rtlCol="0" anchor="b"/>
+          <a:lstStyle/>
+          <a:p>
+            <a:pPr algn="ctr"/>
+            <a:r>
+              <a:rPr lang="en-US" altLang="ko-KR" dirty="0" smtClean="0"/>
+              <a:t>Application Server</a:t>
+            </a:r>
+            <a:endParaRPr lang="ko-KR" altLang="en-US" dirty="0"/>
+          </a:p>
+        </p:txBody>
+      </p:sp>
+      <p:sp>
+        <p:nvSpPr>
+          <p:cNvPr id="2" name="제목 1"/>
+          <p:cNvSpPr>
+            <a:spLocks noGrp="1"/>
+          </p:cNvSpPr>
+          <p:nvPr>
+            <p:ph type="title"/>
+          </p:nvPr>
+        </p:nvSpPr>
+        <p:spPr>
+          <a:xfrm>
+            <a:off x="457200" y="-20538"/>
+            <a:ext cx="8229600" cy="857250"/>
+          </a:xfrm>
+        </p:spPr>
+        <p:txBody>
+          <a:bodyPr/>
+          <a:lstStyle/>
+          <a:p>
+            <a:r>
+              <a:rPr lang="en-US" altLang="ko-KR" dirty="0" err="1" smtClean="0"/>
+              <a:t>MVC</a:t>
+            </a:r>
+            <a:r>
+              <a:rPr lang="en-US" altLang="ko-KR" dirty="0" smtClean="0"/>
+              <a:t> Model 1 with </a:t>
+            </a:r>
+            <a:r>
+              <a:rPr lang="en-US" altLang="ko-KR" dirty="0" err="1" smtClean="0"/>
+              <a:t>JSP</a:t>
+            </a:r>
+            <a:endParaRPr lang="ko-KR" altLang="en-US" dirty="0"/>
+          </a:p>
+        </p:txBody>
+      </p:sp>
+      <p:sp>
+        <p:nvSpPr>
+          <p:cNvPr id="21" name="모서리가 둥근 직사각형 20"/>
+          <p:cNvSpPr/>
+          <p:nvPr/>
+        </p:nvSpPr>
+        <p:spPr>
+          <a:xfrm>
+            <a:off x="1043608" y="1203598"/>
+            <a:ext cx="1440160" cy="720080"/>
           </a:xfrm>
           <a:prstGeom prst="roundRect">
             <a:avLst>
@@ -3961,7 +4497,7 @@
             <a:pPr algn="ctr"/>
             <a:r>
               <a:rPr lang="en-US" altLang="ko-KR" dirty="0" smtClean="0"/>
-              <a:t>View</a:t>
+              <a:t>Web Browser</a:t>
             </a:r>
             <a:endParaRPr lang="ko-KR" altLang="en-US" dirty="0"/>
           </a:p>
@@ -3969,14 +4505,14 @@
       </p:sp>
       <p:sp>
         <p:nvSpPr>
-          <p:cNvPr id="28" name="모서리가 둥근 직사각형 27"/>
+          <p:cNvPr id="31" name="모서리가 둥근 직사각형 30"/>
           <p:cNvSpPr/>
           <p:nvPr/>
         </p:nvSpPr>
         <p:spPr>
           <a:xfrm>
-            <a:off x="3747948" y="1302302"/>
-            <a:ext cx="1872208" cy="936104"/>
+            <a:off x="3419872" y="1203598"/>
+            <a:ext cx="2160240" cy="720080"/>
           </a:xfrm>
           <a:prstGeom prst="roundRect">
             <a:avLst>
@@ -4004,8 +4540,24 @@
           <a:p>
             <a:pPr algn="ctr"/>
             <a:r>
+              <a:rPr lang="en-US" altLang="ko-KR" dirty="0" err="1" smtClean="0"/>
+              <a:t>JSP</a:t>
+            </a:r>
+            <a:endParaRPr lang="en-US" altLang="ko-KR" dirty="0" smtClean="0"/>
+          </a:p>
+          <a:p>
+            <a:pPr algn="ctr"/>
+            <a:r>
               <a:rPr lang="en-US" altLang="ko-KR" dirty="0" smtClean="0"/>
-              <a:t>View</a:t>
+              <a:t>(</a:t>
+            </a:r>
+            <a:r>
+              <a:rPr lang="en-US" altLang="ko-KR" dirty="0" smtClean="0"/>
+              <a:t>Controller / View</a:t>
+            </a:r>
+            <a:r>
+              <a:rPr lang="en-US" altLang="ko-KR" dirty="0" smtClean="0"/>
+              <a:t>)</a:t>
             </a:r>
             <a:endParaRPr lang="ko-KR" altLang="en-US" dirty="0"/>
           </a:p>
@@ -4013,14 +4565,14 @@
       </p:sp>
       <p:sp>
         <p:nvSpPr>
-          <p:cNvPr id="29" name="모서리가 둥근 직사각형 28"/>
+          <p:cNvPr id="33" name="모서리가 둥근 직사각형 32"/>
           <p:cNvSpPr/>
           <p:nvPr/>
         </p:nvSpPr>
         <p:spPr>
           <a:xfrm>
-            <a:off x="3654512" y="1392926"/>
-            <a:ext cx="1872208" cy="936104"/>
+            <a:off x="3419872" y="2283718"/>
+            <a:ext cx="2160240" cy="720080"/>
           </a:xfrm>
           <a:prstGeom prst="roundRect">
             <a:avLst>
@@ -4049,9 +4601,1442 @@
             <a:pPr algn="ctr"/>
             <a:r>
               <a:rPr lang="en-US" altLang="ko-KR" dirty="0" smtClean="0"/>
+              <a:t>Business Logic</a:t>
+            </a:r>
+          </a:p>
+          <a:p>
+            <a:pPr algn="ctr"/>
+            <a:r>
+              <a:rPr lang="en-US" altLang="ko-KR" dirty="0" smtClean="0"/>
+              <a:t>(Model)</a:t>
+            </a:r>
+            <a:endParaRPr lang="ko-KR" altLang="en-US" dirty="0"/>
+          </a:p>
+        </p:txBody>
+      </p:sp>
+      <p:sp>
+        <p:nvSpPr>
+          <p:cNvPr id="34" name="모서리가 둥근 직사각형 33"/>
+          <p:cNvSpPr/>
+          <p:nvPr/>
+        </p:nvSpPr>
+        <p:spPr>
+          <a:xfrm>
+            <a:off x="6516216" y="3363838"/>
+            <a:ext cx="1440160" cy="720080"/>
+          </a:xfrm>
+          <a:prstGeom prst="roundRect">
+            <a:avLst>
+              <a:gd name="adj" fmla="val 10708"/>
+            </a:avLst>
+          </a:prstGeom>
+        </p:spPr>
+        <p:style>
+          <a:lnRef idx="2">
+            <a:schemeClr val="dk1"/>
+          </a:lnRef>
+          <a:fillRef idx="1">
+            <a:schemeClr val="lt1"/>
+          </a:fillRef>
+          <a:effectRef idx="0">
+            <a:schemeClr val="dk1"/>
+          </a:effectRef>
+          <a:fontRef idx="minor">
+            <a:schemeClr val="dk1"/>
+          </a:fontRef>
+        </p:style>
+        <p:txBody>
+          <a:bodyPr rtlCol="0" anchor="ctr"/>
+          <a:lstStyle/>
+          <a:p>
+            <a:pPr algn="ctr"/>
+            <a:r>
+              <a:rPr lang="en-US" altLang="ko-KR" dirty="0" smtClean="0"/>
+              <a:t>Data </a:t>
+            </a:r>
+            <a:r>
+              <a:rPr lang="en-US" altLang="ko-KR" dirty="0" smtClean="0"/>
+              <a:t>Base</a:t>
+            </a:r>
+            <a:endParaRPr lang="en-US" altLang="ko-KR" dirty="0" smtClean="0"/>
+          </a:p>
+        </p:txBody>
+      </p:sp>
+      <p:cxnSp>
+        <p:nvCxnSpPr>
+          <p:cNvPr id="8" name="직선 화살표 연결선 7"/>
+          <p:cNvCxnSpPr/>
+          <p:nvPr/>
+        </p:nvCxnSpPr>
+        <p:spPr>
+          <a:xfrm>
+            <a:off x="2483768" y="1707654"/>
+            <a:ext cx="936104" cy="0"/>
+          </a:xfrm>
+          <a:prstGeom prst="straightConnector1">
+            <a:avLst/>
+          </a:prstGeom>
+          <a:ln w="28575">
+            <a:solidFill>
+              <a:schemeClr val="tx1"/>
+            </a:solidFill>
+            <a:headEnd type="arrow" w="med" len="med"/>
+            <a:tailEnd type="none" w="med" len="med"/>
+          </a:ln>
+        </p:spPr>
+        <p:style>
+          <a:lnRef idx="1">
+            <a:schemeClr val="accent1"/>
+          </a:lnRef>
+          <a:fillRef idx="0">
+            <a:schemeClr val="accent1"/>
+          </a:fillRef>
+          <a:effectRef idx="0">
+            <a:schemeClr val="accent1"/>
+          </a:effectRef>
+          <a:fontRef idx="minor">
+            <a:schemeClr val="tx1"/>
+          </a:fontRef>
+        </p:style>
+      </p:cxnSp>
+      <p:cxnSp>
+        <p:nvCxnSpPr>
+          <p:cNvPr id="11" name="직선 화살표 연결선 10"/>
+          <p:cNvCxnSpPr/>
+          <p:nvPr/>
+        </p:nvCxnSpPr>
+        <p:spPr>
+          <a:xfrm flipH="1">
+            <a:off x="2483768" y="1419622"/>
+            <a:ext cx="936104" cy="0"/>
+          </a:xfrm>
+          <a:prstGeom prst="straightConnector1">
+            <a:avLst/>
+          </a:prstGeom>
+          <a:ln w="28575">
+            <a:solidFill>
+              <a:schemeClr val="tx1"/>
+            </a:solidFill>
+            <a:headEnd type="arrow" w="med" len="med"/>
+            <a:tailEnd type="none" w="med" len="med"/>
+          </a:ln>
+        </p:spPr>
+        <p:style>
+          <a:lnRef idx="1">
+            <a:schemeClr val="accent1"/>
+          </a:lnRef>
+          <a:fillRef idx="0">
+            <a:schemeClr val="accent1"/>
+          </a:fillRef>
+          <a:effectRef idx="0">
+            <a:schemeClr val="accent1"/>
+          </a:effectRef>
+          <a:fontRef idx="minor">
+            <a:schemeClr val="tx1"/>
+          </a:fontRef>
+        </p:style>
+      </p:cxnSp>
+      <p:cxnSp>
+        <p:nvCxnSpPr>
+          <p:cNvPr id="14" name="직선 화살표 연결선 13"/>
+          <p:cNvCxnSpPr/>
+          <p:nvPr/>
+        </p:nvCxnSpPr>
+        <p:spPr>
+          <a:xfrm flipV="1">
+            <a:off x="4211960" y="1923678"/>
+            <a:ext cx="0" cy="360040"/>
+          </a:xfrm>
+          <a:prstGeom prst="straightConnector1">
+            <a:avLst/>
+          </a:prstGeom>
+          <a:ln w="28575">
+            <a:solidFill>
+              <a:schemeClr val="tx1"/>
+            </a:solidFill>
+            <a:headEnd type="arrow" w="med" len="med"/>
+            <a:tailEnd type="none" w="med" len="med"/>
+          </a:ln>
+        </p:spPr>
+        <p:style>
+          <a:lnRef idx="1">
+            <a:schemeClr val="accent1"/>
+          </a:lnRef>
+          <a:fillRef idx="0">
+            <a:schemeClr val="accent1"/>
+          </a:fillRef>
+          <a:effectRef idx="0">
+            <a:schemeClr val="accent1"/>
+          </a:effectRef>
+          <a:fontRef idx="minor">
+            <a:schemeClr val="tx1"/>
+          </a:fontRef>
+        </p:style>
+      </p:cxnSp>
+      <p:cxnSp>
+        <p:nvCxnSpPr>
+          <p:cNvPr id="20" name="직선 화살표 연결선 19"/>
+          <p:cNvCxnSpPr/>
+          <p:nvPr/>
+        </p:nvCxnSpPr>
+        <p:spPr>
+          <a:xfrm flipH="1">
+            <a:off x="5580112" y="3579862"/>
+            <a:ext cx="936104" cy="0"/>
+          </a:xfrm>
+          <a:prstGeom prst="straightConnector1">
+            <a:avLst/>
+          </a:prstGeom>
+          <a:ln w="28575">
+            <a:solidFill>
+              <a:schemeClr val="tx1"/>
+            </a:solidFill>
+            <a:headEnd type="arrow" w="med" len="med"/>
+            <a:tailEnd type="none" w="med" len="med"/>
+          </a:ln>
+        </p:spPr>
+        <p:style>
+          <a:lnRef idx="1">
+            <a:schemeClr val="accent1"/>
+          </a:lnRef>
+          <a:fillRef idx="0">
+            <a:schemeClr val="accent1"/>
+          </a:fillRef>
+          <a:effectRef idx="0">
+            <a:schemeClr val="accent1"/>
+          </a:effectRef>
+          <a:fontRef idx="minor">
+            <a:schemeClr val="tx1"/>
+          </a:fontRef>
+        </p:style>
+      </p:cxnSp>
+      <p:cxnSp>
+        <p:nvCxnSpPr>
+          <p:cNvPr id="23" name="직선 화살표 연결선 22"/>
+          <p:cNvCxnSpPr/>
+          <p:nvPr/>
+        </p:nvCxnSpPr>
+        <p:spPr>
+          <a:xfrm>
+            <a:off x="5580112" y="3867894"/>
+            <a:ext cx="936104" cy="0"/>
+          </a:xfrm>
+          <a:prstGeom prst="straightConnector1">
+            <a:avLst/>
+          </a:prstGeom>
+          <a:ln w="28575">
+            <a:solidFill>
+              <a:schemeClr val="tx1"/>
+            </a:solidFill>
+            <a:headEnd type="arrow" w="med" len="med"/>
+            <a:tailEnd type="none" w="med" len="med"/>
+          </a:ln>
+        </p:spPr>
+        <p:style>
+          <a:lnRef idx="1">
+            <a:schemeClr val="accent1"/>
+          </a:lnRef>
+          <a:fillRef idx="0">
+            <a:schemeClr val="accent1"/>
+          </a:fillRef>
+          <a:effectRef idx="0">
+            <a:schemeClr val="accent1"/>
+          </a:effectRef>
+          <a:fontRef idx="minor">
+            <a:schemeClr val="tx1"/>
+          </a:fontRef>
+        </p:style>
+      </p:cxnSp>
+      <p:cxnSp>
+        <p:nvCxnSpPr>
+          <p:cNvPr id="26" name="직선 화살표 연결선 25"/>
+          <p:cNvCxnSpPr/>
+          <p:nvPr/>
+        </p:nvCxnSpPr>
+        <p:spPr>
+          <a:xfrm>
+            <a:off x="4788024" y="1923678"/>
+            <a:ext cx="0" cy="360040"/>
+          </a:xfrm>
+          <a:prstGeom prst="straightConnector1">
+            <a:avLst/>
+          </a:prstGeom>
+          <a:ln w="28575">
+            <a:solidFill>
+              <a:schemeClr val="tx1"/>
+            </a:solidFill>
+            <a:headEnd type="arrow" w="med" len="med"/>
+            <a:tailEnd type="none" w="med" len="med"/>
+          </a:ln>
+        </p:spPr>
+        <p:style>
+          <a:lnRef idx="1">
+            <a:schemeClr val="accent1"/>
+          </a:lnRef>
+          <a:fillRef idx="0">
+            <a:schemeClr val="accent1"/>
+          </a:fillRef>
+          <a:effectRef idx="0">
+            <a:schemeClr val="accent1"/>
+          </a:effectRef>
+          <a:fontRef idx="minor">
+            <a:schemeClr val="tx1"/>
+          </a:fontRef>
+        </p:style>
+      </p:cxnSp>
+      <p:sp>
+        <p:nvSpPr>
+          <p:cNvPr id="29" name="모서리가 둥근 직사각형 28"/>
+          <p:cNvSpPr/>
+          <p:nvPr/>
+        </p:nvSpPr>
+        <p:spPr>
+          <a:xfrm>
+            <a:off x="3419872" y="3363838"/>
+            <a:ext cx="2160240" cy="720080"/>
+          </a:xfrm>
+          <a:prstGeom prst="roundRect">
+            <a:avLst>
+              <a:gd name="adj" fmla="val 10708"/>
+            </a:avLst>
+          </a:prstGeom>
+        </p:spPr>
+        <p:style>
+          <a:lnRef idx="2">
+            <a:schemeClr val="dk1"/>
+          </a:lnRef>
+          <a:fillRef idx="1">
+            <a:schemeClr val="lt1"/>
+          </a:fillRef>
+          <a:effectRef idx="0">
+            <a:schemeClr val="dk1"/>
+          </a:effectRef>
+          <a:fontRef idx="minor">
+            <a:schemeClr val="dk1"/>
+          </a:fontRef>
+        </p:style>
+        <p:txBody>
+          <a:bodyPr rtlCol="0" anchor="ctr"/>
+          <a:lstStyle/>
+          <a:p>
+            <a:pPr algn="ctr"/>
+            <a:r>
+              <a:rPr lang="en-US" altLang="ko-KR" dirty="0" smtClean="0"/>
+              <a:t>Data Access Object (Model)</a:t>
+            </a:r>
+            <a:endParaRPr lang="ko-KR" altLang="en-US" dirty="0"/>
+          </a:p>
+        </p:txBody>
+      </p:sp>
+      <p:cxnSp>
+        <p:nvCxnSpPr>
+          <p:cNvPr id="40" name="직선 화살표 연결선 39"/>
+          <p:cNvCxnSpPr/>
+          <p:nvPr/>
+        </p:nvCxnSpPr>
+        <p:spPr>
+          <a:xfrm flipV="1">
+            <a:off x="4211960" y="3003798"/>
+            <a:ext cx="0" cy="360040"/>
+          </a:xfrm>
+          <a:prstGeom prst="straightConnector1">
+            <a:avLst/>
+          </a:prstGeom>
+          <a:ln w="28575">
+            <a:solidFill>
+              <a:schemeClr val="tx1"/>
+            </a:solidFill>
+            <a:headEnd type="arrow" w="med" len="med"/>
+            <a:tailEnd type="none" w="med" len="med"/>
+          </a:ln>
+        </p:spPr>
+        <p:style>
+          <a:lnRef idx="1">
+            <a:schemeClr val="accent1"/>
+          </a:lnRef>
+          <a:fillRef idx="0">
+            <a:schemeClr val="accent1"/>
+          </a:fillRef>
+          <a:effectRef idx="0">
+            <a:schemeClr val="accent1"/>
+          </a:effectRef>
+          <a:fontRef idx="minor">
+            <a:schemeClr val="tx1"/>
+          </a:fontRef>
+        </p:style>
+      </p:cxnSp>
+      <p:cxnSp>
+        <p:nvCxnSpPr>
+          <p:cNvPr id="41" name="직선 화살표 연결선 40"/>
+          <p:cNvCxnSpPr/>
+          <p:nvPr/>
+        </p:nvCxnSpPr>
+        <p:spPr>
+          <a:xfrm>
+            <a:off x="4788024" y="2978336"/>
+            <a:ext cx="0" cy="360040"/>
+          </a:xfrm>
+          <a:prstGeom prst="straightConnector1">
+            <a:avLst/>
+          </a:prstGeom>
+          <a:ln w="28575">
+            <a:solidFill>
+              <a:schemeClr val="tx1"/>
+            </a:solidFill>
+            <a:headEnd type="arrow" w="med" len="med"/>
+            <a:tailEnd type="none" w="med" len="med"/>
+          </a:ln>
+        </p:spPr>
+        <p:style>
+          <a:lnRef idx="1">
+            <a:schemeClr val="accent1"/>
+          </a:lnRef>
+          <a:fillRef idx="0">
+            <a:schemeClr val="accent1"/>
+          </a:fillRef>
+          <a:effectRef idx="0">
+            <a:schemeClr val="accent1"/>
+          </a:effectRef>
+          <a:fontRef idx="minor">
+            <a:schemeClr val="tx1"/>
+          </a:fontRef>
+        </p:style>
+      </p:cxnSp>
+    </p:spTree>
+    <p:extLst>
+      <p:ext uri="{BB962C8B-B14F-4D97-AF65-F5344CB8AC3E}">
+        <p14:creationId xmlns:p14="http://schemas.microsoft.com/office/powerpoint/2010/main" val="3679793549"/>
+      </p:ext>
+    </p:extLst>
+  </p:cSld>
+  <p:clrMapOvr>
+    <a:masterClrMapping/>
+  </p:clrMapOvr>
+  <p:timing>
+    <p:tnLst>
+      <p:par>
+        <p:cTn id="1" dur="indefinite" restart="never" nodeType="tmRoot"/>
+      </p:par>
+    </p:tnLst>
+  </p:timing>
+</p:sld>
+</file>
+
+<file path=ppt/slides/slide3.xml><?xml version="1.0" encoding="utf-8"?>
+<p:sld xmlns:a="http://schemas.openxmlformats.org/drawingml/2006/main" xmlns:r="http://schemas.openxmlformats.org/officeDocument/2006/relationships" xmlns:p="http://schemas.openxmlformats.org/presentationml/2006/main">
+  <p:cSld>
+    <p:spTree>
+      <p:nvGrpSpPr>
+        <p:cNvPr id="1" name=""/>
+        <p:cNvGrpSpPr/>
+        <p:nvPr/>
+      </p:nvGrpSpPr>
+      <p:grpSpPr>
+        <a:xfrm>
+          <a:off x="0" y="0"/>
+          <a:ext cx="0" cy="0"/>
+          <a:chOff x="0" y="0"/>
+          <a:chExt cx="0" cy="0"/>
+        </a:xfrm>
+      </p:grpSpPr>
+      <p:sp>
+        <p:nvSpPr>
+          <p:cNvPr id="2" name="제목 1"/>
+          <p:cNvSpPr>
+            <a:spLocks noGrp="1"/>
+          </p:cNvSpPr>
+          <p:nvPr>
+            <p:ph type="title"/>
+          </p:nvPr>
+        </p:nvSpPr>
+        <p:spPr>
+          <a:xfrm>
+            <a:off x="457200" y="-20538"/>
+            <a:ext cx="8229600" cy="857250"/>
+          </a:xfrm>
+        </p:spPr>
+        <p:txBody>
+          <a:bodyPr/>
+          <a:lstStyle/>
+          <a:p>
+            <a:r>
+              <a:rPr lang="en-US" altLang="ko-KR" dirty="0" err="1" smtClean="0"/>
+              <a:t>MVC</a:t>
+            </a:r>
+            <a:r>
+              <a:rPr lang="en-US" altLang="ko-KR" dirty="0" smtClean="0"/>
+              <a:t> Model 2 with </a:t>
+            </a:r>
+            <a:r>
+              <a:rPr lang="en-US" altLang="ko-KR" dirty="0" err="1" smtClean="0"/>
+              <a:t>JSP</a:t>
+            </a:r>
+            <a:r>
+              <a:rPr lang="en-US" altLang="ko-KR" dirty="0" smtClean="0"/>
+              <a:t>/Servlet</a:t>
+            </a:r>
+            <a:endParaRPr lang="ko-KR" altLang="en-US" dirty="0"/>
+          </a:p>
+        </p:txBody>
+      </p:sp>
+      <p:sp>
+        <p:nvSpPr>
+          <p:cNvPr id="23" name="모서리가 둥근 직사각형 22"/>
+          <p:cNvSpPr/>
+          <p:nvPr/>
+        </p:nvSpPr>
+        <p:spPr>
+          <a:xfrm>
+            <a:off x="2483768" y="1131590"/>
+            <a:ext cx="4176464" cy="3456384"/>
+          </a:xfrm>
+          <a:prstGeom prst="roundRect">
+            <a:avLst>
+              <a:gd name="adj" fmla="val 3964"/>
+            </a:avLst>
+          </a:prstGeom>
+        </p:spPr>
+        <p:style>
+          <a:lnRef idx="2">
+            <a:schemeClr val="dk1"/>
+          </a:lnRef>
+          <a:fillRef idx="1">
+            <a:schemeClr val="lt1"/>
+          </a:fillRef>
+          <a:effectRef idx="0">
+            <a:schemeClr val="dk1"/>
+          </a:effectRef>
+          <a:fontRef idx="minor">
+            <a:schemeClr val="dk1"/>
+          </a:fontRef>
+        </p:style>
+        <p:txBody>
+          <a:bodyPr rtlCol="0" anchor="b"/>
+          <a:lstStyle/>
+          <a:p>
+            <a:pPr algn="ctr"/>
+            <a:r>
+              <a:rPr lang="en-US" altLang="ko-KR" dirty="0" smtClean="0"/>
+              <a:t>Application Server</a:t>
+            </a:r>
+            <a:endParaRPr lang="ko-KR" altLang="en-US" dirty="0"/>
+          </a:p>
+        </p:txBody>
+      </p:sp>
+      <p:sp>
+        <p:nvSpPr>
+          <p:cNvPr id="24" name="모서리가 둥근 직사각형 23"/>
+          <p:cNvSpPr/>
+          <p:nvPr/>
+        </p:nvSpPr>
+        <p:spPr>
+          <a:xfrm>
+            <a:off x="611560" y="1275606"/>
+            <a:ext cx="1440160" cy="720080"/>
+          </a:xfrm>
+          <a:prstGeom prst="roundRect">
+            <a:avLst>
+              <a:gd name="adj" fmla="val 10708"/>
+            </a:avLst>
+          </a:prstGeom>
+        </p:spPr>
+        <p:style>
+          <a:lnRef idx="2">
+            <a:schemeClr val="dk1"/>
+          </a:lnRef>
+          <a:fillRef idx="1">
+            <a:schemeClr val="lt1"/>
+          </a:fillRef>
+          <a:effectRef idx="0">
+            <a:schemeClr val="dk1"/>
+          </a:effectRef>
+          <a:fontRef idx="minor">
+            <a:schemeClr val="dk1"/>
+          </a:fontRef>
+        </p:style>
+        <p:txBody>
+          <a:bodyPr rtlCol="0" anchor="ctr"/>
+          <a:lstStyle/>
+          <a:p>
+            <a:pPr algn="ctr"/>
+            <a:r>
+              <a:rPr lang="en-US" altLang="ko-KR" dirty="0" smtClean="0"/>
+              <a:t>Web Browser</a:t>
+            </a:r>
+            <a:endParaRPr lang="ko-KR" altLang="en-US" dirty="0"/>
+          </a:p>
+        </p:txBody>
+      </p:sp>
+      <p:sp>
+        <p:nvSpPr>
+          <p:cNvPr id="25" name="모서리가 둥근 직사각형 24"/>
+          <p:cNvSpPr/>
+          <p:nvPr/>
+        </p:nvSpPr>
+        <p:spPr>
+          <a:xfrm>
+            <a:off x="4211960" y="1275606"/>
+            <a:ext cx="2160240" cy="720080"/>
+          </a:xfrm>
+          <a:prstGeom prst="roundRect">
+            <a:avLst>
+              <a:gd name="adj" fmla="val 10708"/>
+            </a:avLst>
+          </a:prstGeom>
+        </p:spPr>
+        <p:style>
+          <a:lnRef idx="2">
+            <a:schemeClr val="dk1"/>
+          </a:lnRef>
+          <a:fillRef idx="1">
+            <a:schemeClr val="lt1"/>
+          </a:fillRef>
+          <a:effectRef idx="0">
+            <a:schemeClr val="dk1"/>
+          </a:effectRef>
+          <a:fontRef idx="minor">
+            <a:schemeClr val="dk1"/>
+          </a:fontRef>
+        </p:style>
+        <p:txBody>
+          <a:bodyPr rtlCol="0" anchor="ctr"/>
+          <a:lstStyle/>
+          <a:p>
+            <a:pPr algn="ctr"/>
+            <a:r>
+              <a:rPr lang="en-US" altLang="ko-KR" dirty="0" smtClean="0"/>
+              <a:t>Servlet</a:t>
+            </a:r>
+            <a:endParaRPr lang="en-US" altLang="ko-KR" dirty="0" smtClean="0"/>
+          </a:p>
+          <a:p>
+            <a:pPr algn="ctr"/>
+            <a:r>
+              <a:rPr lang="en-US" altLang="ko-KR" dirty="0" smtClean="0"/>
+              <a:t>(</a:t>
+            </a:r>
+            <a:r>
+              <a:rPr lang="en-US" altLang="ko-KR" dirty="0" smtClean="0"/>
+              <a:t>Controller)</a:t>
+            </a:r>
+            <a:endParaRPr lang="ko-KR" altLang="en-US" dirty="0"/>
+          </a:p>
+        </p:txBody>
+      </p:sp>
+      <p:sp>
+        <p:nvSpPr>
+          <p:cNvPr id="26" name="모서리가 둥근 직사각형 25"/>
+          <p:cNvSpPr/>
+          <p:nvPr/>
+        </p:nvSpPr>
+        <p:spPr>
+          <a:xfrm>
+            <a:off x="4211960" y="2355726"/>
+            <a:ext cx="2160240" cy="720080"/>
+          </a:xfrm>
+          <a:prstGeom prst="roundRect">
+            <a:avLst>
+              <a:gd name="adj" fmla="val 10708"/>
+            </a:avLst>
+          </a:prstGeom>
+        </p:spPr>
+        <p:style>
+          <a:lnRef idx="2">
+            <a:schemeClr val="dk1"/>
+          </a:lnRef>
+          <a:fillRef idx="1">
+            <a:schemeClr val="lt1"/>
+          </a:fillRef>
+          <a:effectRef idx="0">
+            <a:schemeClr val="dk1"/>
+          </a:effectRef>
+          <a:fontRef idx="minor">
+            <a:schemeClr val="dk1"/>
+          </a:fontRef>
+        </p:style>
+        <p:txBody>
+          <a:bodyPr rtlCol="0" anchor="ctr"/>
+          <a:lstStyle/>
+          <a:p>
+            <a:pPr algn="ctr"/>
+            <a:r>
+              <a:rPr lang="en-US" altLang="ko-KR" dirty="0" smtClean="0"/>
+              <a:t>Business Logic</a:t>
+            </a:r>
+          </a:p>
+          <a:p>
+            <a:pPr algn="ctr"/>
+            <a:r>
+              <a:rPr lang="en-US" altLang="ko-KR" dirty="0" smtClean="0"/>
+              <a:t>(Model)</a:t>
+            </a:r>
+            <a:endParaRPr lang="ko-KR" altLang="en-US" dirty="0"/>
+          </a:p>
+        </p:txBody>
+      </p:sp>
+      <p:sp>
+        <p:nvSpPr>
+          <p:cNvPr id="27" name="모서리가 둥근 직사각형 26"/>
+          <p:cNvSpPr/>
+          <p:nvPr/>
+        </p:nvSpPr>
+        <p:spPr>
+          <a:xfrm>
+            <a:off x="7092280" y="3435846"/>
+            <a:ext cx="1440160" cy="720080"/>
+          </a:xfrm>
+          <a:prstGeom prst="roundRect">
+            <a:avLst>
+              <a:gd name="adj" fmla="val 10708"/>
+            </a:avLst>
+          </a:prstGeom>
+        </p:spPr>
+        <p:style>
+          <a:lnRef idx="2">
+            <a:schemeClr val="dk1"/>
+          </a:lnRef>
+          <a:fillRef idx="1">
+            <a:schemeClr val="lt1"/>
+          </a:fillRef>
+          <a:effectRef idx="0">
+            <a:schemeClr val="dk1"/>
+          </a:effectRef>
+          <a:fontRef idx="minor">
+            <a:schemeClr val="dk1"/>
+          </a:fontRef>
+        </p:style>
+        <p:txBody>
+          <a:bodyPr rtlCol="0" anchor="ctr"/>
+          <a:lstStyle/>
+          <a:p>
+            <a:pPr algn="ctr"/>
+            <a:r>
+              <a:rPr lang="en-US" altLang="ko-KR" dirty="0" smtClean="0"/>
+              <a:t>Data </a:t>
+            </a:r>
+            <a:r>
+              <a:rPr lang="en-US" altLang="ko-KR" dirty="0" smtClean="0"/>
+              <a:t>Base</a:t>
+            </a:r>
+            <a:endParaRPr lang="en-US" altLang="ko-KR" dirty="0" smtClean="0"/>
+          </a:p>
+        </p:txBody>
+      </p:sp>
+      <p:cxnSp>
+        <p:nvCxnSpPr>
+          <p:cNvPr id="28" name="직선 화살표 연결선 27"/>
+          <p:cNvCxnSpPr>
+            <a:stCxn id="41" idx="3"/>
+          </p:cNvCxnSpPr>
+          <p:nvPr/>
+        </p:nvCxnSpPr>
+        <p:spPr>
+          <a:xfrm flipV="1">
+            <a:off x="3779912" y="1779662"/>
+            <a:ext cx="432048" cy="648072"/>
+          </a:xfrm>
+          <a:prstGeom prst="straightConnector1">
+            <a:avLst/>
+          </a:prstGeom>
+          <a:ln w="28575">
+            <a:solidFill>
+              <a:schemeClr val="tx1"/>
+            </a:solidFill>
+            <a:headEnd type="arrow" w="med" len="med"/>
+            <a:tailEnd type="none" w="med" len="med"/>
+          </a:ln>
+        </p:spPr>
+        <p:style>
+          <a:lnRef idx="1">
+            <a:schemeClr val="accent1"/>
+          </a:lnRef>
+          <a:fillRef idx="0">
+            <a:schemeClr val="accent1"/>
+          </a:fillRef>
+          <a:effectRef idx="0">
+            <a:schemeClr val="accent1"/>
+          </a:effectRef>
+          <a:fontRef idx="minor">
+            <a:schemeClr val="tx1"/>
+          </a:fontRef>
+        </p:style>
+      </p:cxnSp>
+      <p:cxnSp>
+        <p:nvCxnSpPr>
+          <p:cNvPr id="29" name="직선 화살표 연결선 28"/>
+          <p:cNvCxnSpPr/>
+          <p:nvPr/>
+        </p:nvCxnSpPr>
+        <p:spPr>
+          <a:xfrm flipH="1">
+            <a:off x="2051720" y="1491630"/>
+            <a:ext cx="2160240" cy="0"/>
+          </a:xfrm>
+          <a:prstGeom prst="straightConnector1">
+            <a:avLst/>
+          </a:prstGeom>
+          <a:ln w="28575">
+            <a:solidFill>
+              <a:schemeClr val="tx1"/>
+            </a:solidFill>
+            <a:headEnd type="arrow" w="med" len="med"/>
+            <a:tailEnd type="none" w="med" len="med"/>
+          </a:ln>
+        </p:spPr>
+        <p:style>
+          <a:lnRef idx="1">
+            <a:schemeClr val="accent1"/>
+          </a:lnRef>
+          <a:fillRef idx="0">
+            <a:schemeClr val="accent1"/>
+          </a:fillRef>
+          <a:effectRef idx="0">
+            <a:schemeClr val="accent1"/>
+          </a:effectRef>
+          <a:fontRef idx="minor">
+            <a:schemeClr val="tx1"/>
+          </a:fontRef>
+        </p:style>
+      </p:cxnSp>
+      <p:cxnSp>
+        <p:nvCxnSpPr>
+          <p:cNvPr id="30" name="직선 화살표 연결선 29"/>
+          <p:cNvCxnSpPr/>
+          <p:nvPr/>
+        </p:nvCxnSpPr>
+        <p:spPr>
+          <a:xfrm flipV="1">
+            <a:off x="5004048" y="1995686"/>
+            <a:ext cx="0" cy="360040"/>
+          </a:xfrm>
+          <a:prstGeom prst="straightConnector1">
+            <a:avLst/>
+          </a:prstGeom>
+          <a:ln w="28575">
+            <a:solidFill>
+              <a:schemeClr val="tx1"/>
+            </a:solidFill>
+            <a:headEnd type="arrow" w="med" len="med"/>
+            <a:tailEnd type="none" w="med" len="med"/>
+          </a:ln>
+        </p:spPr>
+        <p:style>
+          <a:lnRef idx="1">
+            <a:schemeClr val="accent1"/>
+          </a:lnRef>
+          <a:fillRef idx="0">
+            <a:schemeClr val="accent1"/>
+          </a:fillRef>
+          <a:effectRef idx="0">
+            <a:schemeClr val="accent1"/>
+          </a:effectRef>
+          <a:fontRef idx="minor">
+            <a:schemeClr val="tx1"/>
+          </a:fontRef>
+        </p:style>
+      </p:cxnSp>
+      <p:cxnSp>
+        <p:nvCxnSpPr>
+          <p:cNvPr id="35" name="직선 화살표 연결선 34"/>
+          <p:cNvCxnSpPr/>
+          <p:nvPr/>
+        </p:nvCxnSpPr>
+        <p:spPr>
+          <a:xfrm flipH="1">
+            <a:off x="6372200" y="3651870"/>
+            <a:ext cx="720080" cy="0"/>
+          </a:xfrm>
+          <a:prstGeom prst="straightConnector1">
+            <a:avLst/>
+          </a:prstGeom>
+          <a:ln w="28575">
+            <a:solidFill>
+              <a:schemeClr val="tx1"/>
+            </a:solidFill>
+            <a:headEnd type="arrow" w="med" len="med"/>
+            <a:tailEnd type="none" w="med" len="med"/>
+          </a:ln>
+        </p:spPr>
+        <p:style>
+          <a:lnRef idx="1">
+            <a:schemeClr val="accent1"/>
+          </a:lnRef>
+          <a:fillRef idx="0">
+            <a:schemeClr val="accent1"/>
+          </a:fillRef>
+          <a:effectRef idx="0">
+            <a:schemeClr val="accent1"/>
+          </a:effectRef>
+          <a:fontRef idx="minor">
+            <a:schemeClr val="tx1"/>
+          </a:fontRef>
+        </p:style>
+      </p:cxnSp>
+      <p:cxnSp>
+        <p:nvCxnSpPr>
+          <p:cNvPr id="36" name="직선 화살표 연결선 35"/>
+          <p:cNvCxnSpPr/>
+          <p:nvPr/>
+        </p:nvCxnSpPr>
+        <p:spPr>
+          <a:xfrm>
+            <a:off x="6372200" y="3939902"/>
+            <a:ext cx="720080" cy="0"/>
+          </a:xfrm>
+          <a:prstGeom prst="straightConnector1">
+            <a:avLst/>
+          </a:prstGeom>
+          <a:ln w="28575">
+            <a:solidFill>
+              <a:schemeClr val="tx1"/>
+            </a:solidFill>
+            <a:headEnd type="arrow" w="med" len="med"/>
+            <a:tailEnd type="none" w="med" len="med"/>
+          </a:ln>
+        </p:spPr>
+        <p:style>
+          <a:lnRef idx="1">
+            <a:schemeClr val="accent1"/>
+          </a:lnRef>
+          <a:fillRef idx="0">
+            <a:schemeClr val="accent1"/>
+          </a:fillRef>
+          <a:effectRef idx="0">
+            <a:schemeClr val="accent1"/>
+          </a:effectRef>
+          <a:fontRef idx="minor">
+            <a:schemeClr val="tx1"/>
+          </a:fontRef>
+        </p:style>
+      </p:cxnSp>
+      <p:cxnSp>
+        <p:nvCxnSpPr>
+          <p:cNvPr id="37" name="직선 화살표 연결선 36"/>
+          <p:cNvCxnSpPr/>
+          <p:nvPr/>
+        </p:nvCxnSpPr>
+        <p:spPr>
+          <a:xfrm>
+            <a:off x="5580112" y="1995686"/>
+            <a:ext cx="0" cy="360040"/>
+          </a:xfrm>
+          <a:prstGeom prst="straightConnector1">
+            <a:avLst/>
+          </a:prstGeom>
+          <a:ln w="28575">
+            <a:solidFill>
+              <a:schemeClr val="tx1"/>
+            </a:solidFill>
+            <a:headEnd type="arrow" w="med" len="med"/>
+            <a:tailEnd type="none" w="med" len="med"/>
+          </a:ln>
+        </p:spPr>
+        <p:style>
+          <a:lnRef idx="1">
+            <a:schemeClr val="accent1"/>
+          </a:lnRef>
+          <a:fillRef idx="0">
+            <a:schemeClr val="accent1"/>
+          </a:fillRef>
+          <a:effectRef idx="0">
+            <a:schemeClr val="accent1"/>
+          </a:effectRef>
+          <a:fontRef idx="minor">
+            <a:schemeClr val="tx1"/>
+          </a:fontRef>
+        </p:style>
+      </p:cxnSp>
+      <p:sp>
+        <p:nvSpPr>
+          <p:cNvPr id="38" name="모서리가 둥근 직사각형 37"/>
+          <p:cNvSpPr/>
+          <p:nvPr/>
+        </p:nvSpPr>
+        <p:spPr>
+          <a:xfrm>
+            <a:off x="4211960" y="3435846"/>
+            <a:ext cx="2160240" cy="720080"/>
+          </a:xfrm>
+          <a:prstGeom prst="roundRect">
+            <a:avLst>
+              <a:gd name="adj" fmla="val 10708"/>
+            </a:avLst>
+          </a:prstGeom>
+        </p:spPr>
+        <p:style>
+          <a:lnRef idx="2">
+            <a:schemeClr val="dk1"/>
+          </a:lnRef>
+          <a:fillRef idx="1">
+            <a:schemeClr val="lt1"/>
+          </a:fillRef>
+          <a:effectRef idx="0">
+            <a:schemeClr val="dk1"/>
+          </a:effectRef>
+          <a:fontRef idx="minor">
+            <a:schemeClr val="dk1"/>
+          </a:fontRef>
+        </p:style>
+        <p:txBody>
+          <a:bodyPr rtlCol="0" anchor="ctr"/>
+          <a:lstStyle/>
+          <a:p>
+            <a:pPr algn="ctr"/>
+            <a:r>
+              <a:rPr lang="en-US" altLang="ko-KR" dirty="0" smtClean="0"/>
+              <a:t>Data Access Object (Model)</a:t>
+            </a:r>
+            <a:endParaRPr lang="ko-KR" altLang="en-US" dirty="0"/>
+          </a:p>
+        </p:txBody>
+      </p:sp>
+      <p:cxnSp>
+        <p:nvCxnSpPr>
+          <p:cNvPr id="39" name="직선 화살표 연결선 38"/>
+          <p:cNvCxnSpPr/>
+          <p:nvPr/>
+        </p:nvCxnSpPr>
+        <p:spPr>
+          <a:xfrm flipV="1">
+            <a:off x="5004048" y="3075806"/>
+            <a:ext cx="0" cy="360040"/>
+          </a:xfrm>
+          <a:prstGeom prst="straightConnector1">
+            <a:avLst/>
+          </a:prstGeom>
+          <a:ln w="28575">
+            <a:solidFill>
+              <a:schemeClr val="tx1"/>
+            </a:solidFill>
+            <a:headEnd type="arrow" w="med" len="med"/>
+            <a:tailEnd type="none" w="med" len="med"/>
+          </a:ln>
+        </p:spPr>
+        <p:style>
+          <a:lnRef idx="1">
+            <a:schemeClr val="accent1"/>
+          </a:lnRef>
+          <a:fillRef idx="0">
+            <a:schemeClr val="accent1"/>
+          </a:fillRef>
+          <a:effectRef idx="0">
+            <a:schemeClr val="accent1"/>
+          </a:effectRef>
+          <a:fontRef idx="minor">
+            <a:schemeClr val="tx1"/>
+          </a:fontRef>
+        </p:style>
+      </p:cxnSp>
+      <p:cxnSp>
+        <p:nvCxnSpPr>
+          <p:cNvPr id="40" name="직선 화살표 연결선 39"/>
+          <p:cNvCxnSpPr/>
+          <p:nvPr/>
+        </p:nvCxnSpPr>
+        <p:spPr>
+          <a:xfrm>
+            <a:off x="5580112" y="3050344"/>
+            <a:ext cx="0" cy="360040"/>
+          </a:xfrm>
+          <a:prstGeom prst="straightConnector1">
+            <a:avLst/>
+          </a:prstGeom>
+          <a:ln w="28575">
+            <a:solidFill>
+              <a:schemeClr val="tx1"/>
+            </a:solidFill>
+            <a:headEnd type="arrow" w="med" len="med"/>
+            <a:tailEnd type="none" w="med" len="med"/>
+          </a:ln>
+        </p:spPr>
+        <p:style>
+          <a:lnRef idx="1">
+            <a:schemeClr val="accent1"/>
+          </a:lnRef>
+          <a:fillRef idx="0">
+            <a:schemeClr val="accent1"/>
+          </a:fillRef>
+          <a:effectRef idx="0">
+            <a:schemeClr val="accent1"/>
+          </a:effectRef>
+          <a:fontRef idx="minor">
+            <a:schemeClr val="tx1"/>
+          </a:fontRef>
+        </p:style>
+      </p:cxnSp>
+      <p:sp>
+        <p:nvSpPr>
+          <p:cNvPr id="41" name="모서리가 둥근 직사각형 40"/>
+          <p:cNvSpPr/>
+          <p:nvPr/>
+        </p:nvSpPr>
+        <p:spPr>
+          <a:xfrm>
+            <a:off x="2627784" y="2067694"/>
+            <a:ext cx="1152128" cy="720080"/>
+          </a:xfrm>
+          <a:prstGeom prst="roundRect">
+            <a:avLst>
+              <a:gd name="adj" fmla="val 10708"/>
+            </a:avLst>
+          </a:prstGeom>
+        </p:spPr>
+        <p:style>
+          <a:lnRef idx="2">
+            <a:schemeClr val="dk1"/>
+          </a:lnRef>
+          <a:fillRef idx="1">
+            <a:schemeClr val="lt1"/>
+          </a:fillRef>
+          <a:effectRef idx="0">
+            <a:schemeClr val="dk1"/>
+          </a:effectRef>
+          <a:fontRef idx="minor">
+            <a:schemeClr val="dk1"/>
+          </a:fontRef>
+        </p:style>
+        <p:txBody>
+          <a:bodyPr rtlCol="0" anchor="ctr"/>
+          <a:lstStyle/>
+          <a:p>
+            <a:pPr algn="ctr"/>
+            <a:r>
+              <a:rPr lang="en-US" altLang="ko-KR" dirty="0" err="1" smtClean="0"/>
+              <a:t>JSP</a:t>
+            </a:r>
+            <a:endParaRPr lang="en-US" altLang="ko-KR" dirty="0" smtClean="0"/>
+          </a:p>
+          <a:p>
+            <a:pPr algn="ctr"/>
+            <a:r>
+              <a:rPr lang="en-US" altLang="ko-KR" dirty="0" smtClean="0"/>
+              <a:t>(View</a:t>
+            </a:r>
+            <a:r>
+              <a:rPr lang="en-US" altLang="ko-KR" dirty="0" smtClean="0"/>
+              <a:t>)</a:t>
+            </a:r>
+            <a:endParaRPr lang="ko-KR" altLang="en-US" dirty="0"/>
+          </a:p>
+        </p:txBody>
+      </p:sp>
+      <p:cxnSp>
+        <p:nvCxnSpPr>
+          <p:cNvPr id="42" name="직선 화살표 연결선 41"/>
+          <p:cNvCxnSpPr>
+            <a:endCxn id="41" idx="1"/>
+          </p:cNvCxnSpPr>
+          <p:nvPr/>
+        </p:nvCxnSpPr>
+        <p:spPr>
+          <a:xfrm>
+            <a:off x="2051720" y="1779662"/>
+            <a:ext cx="576064" cy="648072"/>
+          </a:xfrm>
+          <a:prstGeom prst="straightConnector1">
+            <a:avLst/>
+          </a:prstGeom>
+          <a:ln w="28575">
+            <a:solidFill>
+              <a:schemeClr val="tx1"/>
+            </a:solidFill>
+            <a:headEnd type="arrow" w="med" len="med"/>
+            <a:tailEnd type="none" w="med" len="med"/>
+          </a:ln>
+        </p:spPr>
+        <p:style>
+          <a:lnRef idx="1">
+            <a:schemeClr val="accent1"/>
+          </a:lnRef>
+          <a:fillRef idx="0">
+            <a:schemeClr val="accent1"/>
+          </a:fillRef>
+          <a:effectRef idx="0">
+            <a:schemeClr val="accent1"/>
+          </a:effectRef>
+          <a:fontRef idx="minor">
+            <a:schemeClr val="tx1"/>
+          </a:fontRef>
+        </p:style>
+      </p:cxnSp>
+    </p:spTree>
+    <p:extLst>
+      <p:ext uri="{BB962C8B-B14F-4D97-AF65-F5344CB8AC3E}">
+        <p14:creationId xmlns:p14="http://schemas.microsoft.com/office/powerpoint/2010/main" val="2119802702"/>
+      </p:ext>
+    </p:extLst>
+  </p:cSld>
+  <p:clrMapOvr>
+    <a:masterClrMapping/>
+  </p:clrMapOvr>
+  <p:timing>
+    <p:tnLst>
+      <p:par>
+        <p:cTn id="1" dur="indefinite" restart="never" nodeType="tmRoot"/>
+      </p:par>
+    </p:tnLst>
+  </p:timing>
+</p:sld>
+</file>
+
+<file path=ppt/slides/slide4.xml><?xml version="1.0" encoding="utf-8"?>
+<p:sld xmlns:a="http://schemas.openxmlformats.org/drawingml/2006/main" xmlns:r="http://schemas.openxmlformats.org/officeDocument/2006/relationships" xmlns:p="http://schemas.openxmlformats.org/presentationml/2006/main">
+  <p:cSld>
+    <p:spTree>
+      <p:nvGrpSpPr>
+        <p:cNvPr id="1" name=""/>
+        <p:cNvGrpSpPr/>
+        <p:nvPr/>
+      </p:nvGrpSpPr>
+      <p:grpSpPr>
+        <a:xfrm>
+          <a:off x="0" y="0"/>
+          <a:ext cx="0" cy="0"/>
+          <a:chOff x="0" y="0"/>
+          <a:chExt cx="0" cy="0"/>
+        </a:xfrm>
+      </p:grpSpPr>
+      <p:sp>
+        <p:nvSpPr>
+          <p:cNvPr id="2" name="제목 1"/>
+          <p:cNvSpPr>
+            <a:spLocks noGrp="1"/>
+          </p:cNvSpPr>
+          <p:nvPr>
+            <p:ph type="title"/>
+          </p:nvPr>
+        </p:nvSpPr>
+        <p:spPr>
+          <a:xfrm>
+            <a:off x="457200" y="-20538"/>
+            <a:ext cx="8229600" cy="857250"/>
+          </a:xfrm>
+        </p:spPr>
+        <p:txBody>
+          <a:bodyPr/>
+          <a:lstStyle/>
+          <a:p>
+            <a:r>
+              <a:rPr lang="en-US" altLang="ko-KR" dirty="0" smtClean="0"/>
+              <a:t>MVP Pattern</a:t>
+            </a:r>
+            <a:endParaRPr lang="ko-KR" altLang="en-US" dirty="0"/>
+          </a:p>
+        </p:txBody>
+      </p:sp>
+      <p:sp>
+        <p:nvSpPr>
+          <p:cNvPr id="4" name="모서리가 둥근 직사각형 3"/>
+          <p:cNvSpPr/>
+          <p:nvPr/>
+        </p:nvSpPr>
+        <p:spPr>
+          <a:xfrm>
+            <a:off x="3753953" y="3651870"/>
+            <a:ext cx="1872208" cy="936104"/>
+          </a:xfrm>
+          <a:prstGeom prst="roundRect">
+            <a:avLst>
+              <a:gd name="adj" fmla="val 10708"/>
+            </a:avLst>
+          </a:prstGeom>
+        </p:spPr>
+        <p:style>
+          <a:lnRef idx="2">
+            <a:schemeClr val="dk1"/>
+          </a:lnRef>
+          <a:fillRef idx="1">
+            <a:schemeClr val="lt1"/>
+          </a:fillRef>
+          <a:effectRef idx="0">
+            <a:schemeClr val="dk1"/>
+          </a:effectRef>
+          <a:fontRef idx="minor">
+            <a:schemeClr val="dk1"/>
+          </a:fontRef>
+        </p:style>
+        <p:txBody>
+          <a:bodyPr rtlCol="0" anchor="ctr"/>
+          <a:lstStyle/>
+          <a:p>
+            <a:pPr algn="ctr"/>
+            <a:r>
+              <a:rPr lang="en-US" altLang="ko-KR" dirty="0" smtClean="0"/>
+              <a:t>Model</a:t>
+            </a:r>
+            <a:endParaRPr lang="ko-KR" altLang="en-US" dirty="0"/>
+          </a:p>
+        </p:txBody>
+      </p:sp>
+      <p:sp>
+        <p:nvSpPr>
+          <p:cNvPr id="23" name="모서리가 둥근 직사각형 22"/>
+          <p:cNvSpPr/>
+          <p:nvPr/>
+        </p:nvSpPr>
+        <p:spPr>
+          <a:xfrm>
+            <a:off x="1305681" y="2499742"/>
+            <a:ext cx="1872208" cy="936104"/>
+          </a:xfrm>
+          <a:prstGeom prst="roundRect">
+            <a:avLst>
+              <a:gd name="adj" fmla="val 10708"/>
+            </a:avLst>
+          </a:prstGeom>
+        </p:spPr>
+        <p:style>
+          <a:lnRef idx="2">
+            <a:schemeClr val="dk1"/>
+          </a:lnRef>
+          <a:fillRef idx="1">
+            <a:schemeClr val="lt1"/>
+          </a:fillRef>
+          <a:effectRef idx="0">
+            <a:schemeClr val="dk1"/>
+          </a:effectRef>
+          <a:fontRef idx="minor">
+            <a:schemeClr val="dk1"/>
+          </a:fontRef>
+        </p:style>
+        <p:txBody>
+          <a:bodyPr rtlCol="0" anchor="ctr"/>
+          <a:lstStyle/>
+          <a:p>
+            <a:pPr algn="ctr"/>
+            <a:r>
+              <a:rPr lang="en-US" altLang="ko-KR" dirty="0" smtClean="0"/>
+              <a:t>Present</a:t>
+            </a:r>
+            <a:endParaRPr lang="ko-KR" altLang="en-US" dirty="0"/>
+          </a:p>
+        </p:txBody>
+      </p:sp>
+      <p:sp>
+        <p:nvSpPr>
+          <p:cNvPr id="29" name="모서리가 둥근 직사각형 28"/>
+          <p:cNvSpPr/>
+          <p:nvPr/>
+        </p:nvSpPr>
+        <p:spPr>
+          <a:xfrm>
+            <a:off x="3772569" y="1176902"/>
+            <a:ext cx="1872208" cy="936104"/>
+          </a:xfrm>
+          <a:prstGeom prst="roundRect">
+            <a:avLst>
+              <a:gd name="adj" fmla="val 10708"/>
+            </a:avLst>
+          </a:prstGeom>
+        </p:spPr>
+        <p:style>
+          <a:lnRef idx="2">
+            <a:schemeClr val="dk1"/>
+          </a:lnRef>
+          <a:fillRef idx="1">
+            <a:schemeClr val="lt1"/>
+          </a:fillRef>
+          <a:effectRef idx="0">
+            <a:schemeClr val="dk1"/>
+          </a:effectRef>
+          <a:fontRef idx="minor">
+            <a:schemeClr val="dk1"/>
+          </a:fontRef>
+        </p:style>
+        <p:txBody>
+          <a:bodyPr rtlCol="0" anchor="ctr"/>
+          <a:lstStyle/>
+          <a:p>
+            <a:pPr algn="ctr"/>
+            <a:r>
+              <a:rPr lang="en-US" altLang="ko-KR" dirty="0" smtClean="0"/>
               <a:t>View</a:t>
             </a:r>
             <a:endParaRPr lang="ko-KR" altLang="en-US" dirty="0"/>
+          </a:p>
+        </p:txBody>
+      </p:sp>
+      <p:cxnSp>
+        <p:nvCxnSpPr>
+          <p:cNvPr id="30" name="직선 화살표 연결선 29"/>
+          <p:cNvCxnSpPr/>
+          <p:nvPr/>
+        </p:nvCxnSpPr>
+        <p:spPr>
+          <a:xfrm>
+            <a:off x="5644777" y="1635646"/>
+            <a:ext cx="1741326" cy="0"/>
+          </a:xfrm>
+          <a:prstGeom prst="straightConnector1">
+            <a:avLst/>
+          </a:prstGeom>
+          <a:ln w="28575">
+            <a:solidFill>
+              <a:schemeClr val="tx1"/>
+            </a:solidFill>
+            <a:headEnd type="arrow" w="med" len="med"/>
+            <a:tailEnd type="none" w="med" len="med"/>
+          </a:ln>
+        </p:spPr>
+        <p:style>
+          <a:lnRef idx="1">
+            <a:schemeClr val="accent1"/>
+          </a:lnRef>
+          <a:fillRef idx="0">
+            <a:schemeClr val="accent1"/>
+          </a:fillRef>
+          <a:effectRef idx="0">
+            <a:schemeClr val="accent1"/>
+          </a:effectRef>
+          <a:fontRef idx="minor">
+            <a:schemeClr val="tx1"/>
+          </a:fontRef>
+        </p:style>
+      </p:cxnSp>
+      <p:sp>
+        <p:nvSpPr>
+          <p:cNvPr id="40" name="모서리가 둥근 직사각형 39"/>
+          <p:cNvSpPr/>
+          <p:nvPr/>
+        </p:nvSpPr>
+        <p:spPr>
+          <a:xfrm>
+            <a:off x="5513895" y="1328514"/>
+            <a:ext cx="2082441" cy="307132"/>
+          </a:xfrm>
+          <a:prstGeom prst="roundRect">
+            <a:avLst>
+              <a:gd name="adj" fmla="val 18148"/>
+            </a:avLst>
+          </a:prstGeom>
+          <a:noFill/>
+          <a:ln>
+            <a:noFill/>
+          </a:ln>
+        </p:spPr>
+        <p:style>
+          <a:lnRef idx="2">
+            <a:schemeClr val="dk1"/>
+          </a:lnRef>
+          <a:fillRef idx="1">
+            <a:schemeClr val="lt1"/>
+          </a:fillRef>
+          <a:effectRef idx="0">
+            <a:schemeClr val="dk1"/>
+          </a:effectRef>
+          <a:fontRef idx="minor">
+            <a:schemeClr val="dk1"/>
+          </a:fontRef>
+        </p:style>
+        <p:txBody>
+          <a:bodyPr rtlCol="0" anchor="ctr"/>
+          <a:lstStyle/>
+          <a:p>
+            <a:pPr algn="ctr"/>
+            <a:r>
+              <a:rPr lang="en-US" altLang="ko-KR" sz="1400" b="1" dirty="0" smtClean="0"/>
+              <a:t>User Request</a:t>
+            </a:r>
           </a:p>
         </p:txBody>
       </p:sp>
@@ -4063,7 +6048,7 @@
         </p:nvSpPr>
         <p:spPr>
           <a:xfrm>
-            <a:off x="1907704" y="1684999"/>
+            <a:off x="2025761" y="1468975"/>
             <a:ext cx="1746808" cy="1030767"/>
           </a:xfrm>
           <a:custGeom>
@@ -4142,8 +6127,8 @@
         </p:nvSpPr>
         <p:spPr>
           <a:xfrm flipV="1">
-            <a:off x="1907704" y="3651870"/>
-            <a:ext cx="1872208" cy="936104"/>
+            <a:off x="2025761" y="3435846"/>
+            <a:ext cx="1728192" cy="936104"/>
           </a:xfrm>
           <a:custGeom>
             <a:avLst/>
@@ -4213,44 +6198,6 @@
           </a:p>
         </p:txBody>
       </p:sp>
-      <p:cxnSp>
-        <p:nvCxnSpPr>
-          <p:cNvPr id="53" name="직선 화살표 연결선 52"/>
-          <p:cNvCxnSpPr>
-            <a:endCxn id="29" idx="2"/>
-          </p:cNvCxnSpPr>
-          <p:nvPr/>
-        </p:nvCxnSpPr>
-        <p:spPr>
-          <a:xfrm flipV="1">
-            <a:off x="4590616" y="2329030"/>
-            <a:ext cx="0" cy="1538864"/>
-          </a:xfrm>
-          <a:prstGeom prst="straightConnector1">
-            <a:avLst/>
-          </a:prstGeom>
-          <a:ln w="28575">
-            <a:solidFill>
-              <a:schemeClr val="tx1"/>
-            </a:solidFill>
-            <a:tailEnd type="arrow"/>
-          </a:ln>
-        </p:spPr>
-        <p:style>
-          <a:lnRef idx="1">
-            <a:schemeClr val="accent1"/>
-          </a:lnRef>
-          <a:fillRef idx="0">
-            <a:schemeClr val="accent1"/>
-          </a:fillRef>
-          <a:effectRef idx="0">
-            <a:schemeClr val="accent1"/>
-          </a:effectRef>
-          <a:fontRef idx="minor">
-            <a:schemeClr val="tx1"/>
-          </a:fontRef>
-        </p:style>
-      </p:cxnSp>
       <p:sp>
         <p:nvSpPr>
           <p:cNvPr id="57" name="모서리가 둥근 직사각형 56"/>
@@ -4259,7 +6206,7 @@
         </p:nvSpPr>
         <p:spPr>
           <a:xfrm>
-            <a:off x="1913495" y="1976586"/>
+            <a:off x="1809737" y="1131590"/>
             <a:ext cx="2082441" cy="307132"/>
           </a:xfrm>
           <a:prstGeom prst="roundRect">
@@ -4293,9 +6240,8 @@
             <a:pPr algn="ctr"/>
             <a:r>
               <a:rPr lang="en-US" altLang="ko-KR" sz="1400" b="1" dirty="0" smtClean="0"/>
-              <a:t>Update UI</a:t>
-            </a:r>
-            <a:endParaRPr lang="en-US" altLang="ko-KR" sz="1400" b="1" dirty="0" smtClean="0"/>
+              <a:t>Pass Request</a:t>
+            </a:r>
           </a:p>
         </p:txBody>
       </p:sp>
@@ -4307,7 +6253,7 @@
         </p:nvSpPr>
         <p:spPr>
           <a:xfrm>
-            <a:off x="1763688" y="4227934"/>
+            <a:off x="1881745" y="4371950"/>
             <a:ext cx="2082441" cy="307132"/>
           </a:xfrm>
           <a:prstGeom prst="roundRect">
@@ -4343,238 +6289,19 @@
               <a:rPr lang="en-US" altLang="ko-KR" sz="1400" b="1" dirty="0" smtClean="0"/>
               <a:t>Update Data</a:t>
             </a:r>
-            <a:endParaRPr lang="en-US" altLang="ko-KR" sz="1400" b="1" dirty="0" smtClean="0"/>
-          </a:p>
-        </p:txBody>
-      </p:sp>
-      <p:sp>
-        <p:nvSpPr>
-          <p:cNvPr id="59" name="모서리가 둥근 직사각형 58"/>
+          </a:p>
+        </p:txBody>
+      </p:sp>
+      <p:sp>
+        <p:nvSpPr>
+          <p:cNvPr id="19" name="자유형 18"/>
           <p:cNvSpPr/>
           <p:nvPr/>
         </p:nvSpPr>
         <p:spPr>
           <a:xfrm>
-            <a:off x="4101293" y="2965648"/>
-            <a:ext cx="2082441" cy="307132"/>
-          </a:xfrm>
-          <a:prstGeom prst="roundRect">
-            <a:avLst>
-              <a:gd name="adj" fmla="val 18148"/>
-            </a:avLst>
-          </a:prstGeom>
-          <a:noFill/>
-          <a:ln>
-            <a:noFill/>
-          </a:ln>
-        </p:spPr>
-        <p:style>
-          <a:lnRef idx="2">
-            <a:schemeClr val="dk1"/>
-          </a:lnRef>
-          <a:fillRef idx="1">
-            <a:schemeClr val="lt1"/>
-          </a:fillRef>
-          <a:effectRef idx="0">
-            <a:schemeClr val="dk1"/>
-          </a:effectRef>
-          <a:fontRef idx="minor">
-            <a:schemeClr val="dk1"/>
-          </a:fontRef>
-        </p:style>
-        <p:txBody>
-          <a:bodyPr rtlCol="0" anchor="ctr"/>
-          <a:lstStyle/>
-          <a:p>
-            <a:pPr algn="ctr"/>
-            <a:r>
-              <a:rPr lang="en-US" altLang="ko-KR" sz="1400" b="1" dirty="0" smtClean="0"/>
-              <a:t>Update UI</a:t>
-            </a:r>
-            <a:endParaRPr lang="en-US" altLang="ko-KR" sz="1400" b="1" dirty="0" smtClean="0"/>
-          </a:p>
-        </p:txBody>
-      </p:sp>
-      <p:cxnSp>
-        <p:nvCxnSpPr>
-          <p:cNvPr id="60" name="직선 화살표 연결선 59"/>
-          <p:cNvCxnSpPr/>
-          <p:nvPr/>
-        </p:nvCxnSpPr>
-        <p:spPr>
-          <a:xfrm>
-            <a:off x="5534669" y="1688554"/>
-            <a:ext cx="1741326" cy="0"/>
-          </a:xfrm>
-          <a:prstGeom prst="straightConnector1">
-            <a:avLst/>
-          </a:prstGeom>
-          <a:ln w="28575">
-            <a:solidFill>
-              <a:schemeClr val="tx1"/>
-            </a:solidFill>
-            <a:headEnd type="arrow" w="med" len="med"/>
-            <a:tailEnd type="none" w="med" len="med"/>
-          </a:ln>
-        </p:spPr>
-        <p:style>
-          <a:lnRef idx="1">
-            <a:schemeClr val="accent1"/>
-          </a:lnRef>
-          <a:fillRef idx="0">
-            <a:schemeClr val="accent1"/>
-          </a:fillRef>
-          <a:effectRef idx="0">
-            <a:schemeClr val="accent1"/>
-          </a:effectRef>
-          <a:fontRef idx="minor">
-            <a:schemeClr val="tx1"/>
-          </a:fontRef>
-        </p:style>
-      </p:cxnSp>
-      <p:sp>
-        <p:nvSpPr>
-          <p:cNvPr id="61" name="모서리가 둥근 직사각형 60"/>
-          <p:cNvSpPr/>
-          <p:nvPr/>
-        </p:nvSpPr>
-        <p:spPr>
-          <a:xfrm>
-            <a:off x="5403787" y="1362372"/>
-            <a:ext cx="2082441" cy="307132"/>
-          </a:xfrm>
-          <a:prstGeom prst="roundRect">
-            <a:avLst>
-              <a:gd name="adj" fmla="val 18148"/>
-            </a:avLst>
-          </a:prstGeom>
-          <a:noFill/>
-          <a:ln>
-            <a:noFill/>
-          </a:ln>
-        </p:spPr>
-        <p:style>
-          <a:lnRef idx="2">
-            <a:schemeClr val="dk1"/>
-          </a:lnRef>
-          <a:fillRef idx="1">
-            <a:schemeClr val="lt1"/>
-          </a:fillRef>
-          <a:effectRef idx="0">
-            <a:schemeClr val="dk1"/>
-          </a:effectRef>
-          <a:fontRef idx="minor">
-            <a:schemeClr val="dk1"/>
-          </a:fontRef>
-        </p:style>
-        <p:txBody>
-          <a:bodyPr rtlCol="0" anchor="ctr"/>
-          <a:lstStyle/>
-          <a:p>
-            <a:pPr algn="ctr"/>
-            <a:r>
-              <a:rPr lang="en-US" altLang="ko-KR" sz="1400" b="1" dirty="0" smtClean="0"/>
-              <a:t>User Request</a:t>
-            </a:r>
-            <a:endParaRPr lang="en-US" altLang="ko-KR" sz="1400" b="1" dirty="0" smtClean="0"/>
-          </a:p>
-        </p:txBody>
-      </p:sp>
-      <p:cxnSp>
-        <p:nvCxnSpPr>
-          <p:cNvPr id="62" name="직선 화살표 연결선 61"/>
-          <p:cNvCxnSpPr/>
-          <p:nvPr/>
-        </p:nvCxnSpPr>
-        <p:spPr>
-          <a:xfrm flipH="1">
-            <a:off x="5534669" y="1976586"/>
-            <a:ext cx="1741326" cy="0"/>
-          </a:xfrm>
-          <a:prstGeom prst="straightConnector1">
-            <a:avLst/>
-          </a:prstGeom>
-          <a:ln w="28575">
-            <a:solidFill>
-              <a:schemeClr val="tx1"/>
-            </a:solidFill>
-            <a:headEnd type="arrow" w="med" len="med"/>
-            <a:tailEnd type="none" w="med" len="med"/>
-          </a:ln>
-        </p:spPr>
-        <p:style>
-          <a:lnRef idx="1">
-            <a:schemeClr val="accent1"/>
-          </a:lnRef>
-          <a:fillRef idx="0">
-            <a:schemeClr val="accent1"/>
-          </a:fillRef>
-          <a:effectRef idx="0">
-            <a:schemeClr val="accent1"/>
-          </a:effectRef>
-          <a:fontRef idx="minor">
-            <a:schemeClr val="tx1"/>
-          </a:fontRef>
-        </p:style>
-      </p:cxnSp>
-      <p:sp>
-        <p:nvSpPr>
-          <p:cNvPr id="63" name="모서리가 둥근 직사각형 62"/>
-          <p:cNvSpPr/>
-          <p:nvPr/>
-        </p:nvSpPr>
-        <p:spPr>
-          <a:xfrm>
-            <a:off x="5403787" y="2001986"/>
-            <a:ext cx="2082441" cy="307132"/>
-          </a:xfrm>
-          <a:prstGeom prst="roundRect">
-            <a:avLst>
-              <a:gd name="adj" fmla="val 18148"/>
-            </a:avLst>
-          </a:prstGeom>
-          <a:noFill/>
-          <a:ln>
-            <a:noFill/>
-          </a:ln>
-        </p:spPr>
-        <p:style>
-          <a:lnRef idx="2">
-            <a:schemeClr val="dk1"/>
-          </a:lnRef>
-          <a:fillRef idx="1">
-            <a:schemeClr val="lt1"/>
-          </a:fillRef>
-          <a:effectRef idx="0">
-            <a:schemeClr val="dk1"/>
-          </a:effectRef>
-          <a:fontRef idx="minor">
-            <a:schemeClr val="dk1"/>
-          </a:fontRef>
-        </p:style>
-        <p:txBody>
-          <a:bodyPr rtlCol="0" anchor="ctr"/>
-          <a:lstStyle/>
-          <a:p>
-            <a:pPr algn="ctr"/>
-            <a:r>
-              <a:rPr lang="en-US" altLang="ko-KR" sz="1400" b="1" dirty="0" smtClean="0"/>
-              <a:t>User Response</a:t>
-            </a:r>
-            <a:endParaRPr lang="en-US" altLang="ko-KR" sz="1400" b="1" dirty="0" smtClean="0"/>
-          </a:p>
-        </p:txBody>
-      </p:sp>
-      <p:sp>
-        <p:nvSpPr>
-          <p:cNvPr id="64" name="자유형 63"/>
-          <p:cNvSpPr/>
-          <p:nvPr/>
-        </p:nvSpPr>
-        <p:spPr>
-          <a:xfrm>
-            <a:off x="2267744" y="1976586"/>
-            <a:ext cx="1386768" cy="739181"/>
+            <a:off x="2385801" y="1779662"/>
+            <a:ext cx="1386768" cy="720079"/>
           </a:xfrm>
           <a:custGeom>
             <a:avLst/>
@@ -4646,965 +6373,14 @@
       </p:sp>
       <p:sp>
         <p:nvSpPr>
-          <p:cNvPr id="65" name="모서리가 둥근 직사각형 64"/>
+          <p:cNvPr id="20" name="자유형 19"/>
           <p:cNvSpPr/>
           <p:nvPr/>
         </p:nvSpPr>
         <p:spPr>
-          <a:xfrm>
-            <a:off x="1769479" y="1328514"/>
-            <a:ext cx="2082441" cy="307132"/>
-          </a:xfrm>
-          <a:prstGeom prst="roundRect">
-            <a:avLst>
-              <a:gd name="adj" fmla="val 18148"/>
-            </a:avLst>
-          </a:prstGeom>
-          <a:noFill/>
-          <a:ln>
-            <a:noFill/>
-          </a:ln>
-        </p:spPr>
-        <p:style>
-          <a:lnRef idx="2">
-            <a:schemeClr val="dk1"/>
-          </a:lnRef>
-          <a:fillRef idx="1">
-            <a:schemeClr val="lt1"/>
-          </a:fillRef>
-          <a:effectRef idx="0">
-            <a:schemeClr val="dk1"/>
-          </a:effectRef>
-          <a:fontRef idx="minor">
-            <a:schemeClr val="dk1"/>
-          </a:fontRef>
-        </p:style>
-        <p:txBody>
-          <a:bodyPr rtlCol="0" anchor="ctr"/>
-          <a:lstStyle/>
-          <a:p>
-            <a:pPr algn="ctr"/>
-            <a:r>
-              <a:rPr lang="en-US" altLang="ko-KR" sz="1400" b="1" dirty="0" smtClean="0"/>
-              <a:t>Pass Request</a:t>
-            </a:r>
-            <a:endParaRPr lang="en-US" altLang="ko-KR" sz="1400" b="1" dirty="0" smtClean="0"/>
-          </a:p>
-        </p:txBody>
-      </p:sp>
-    </p:spTree>
-    <p:extLst>
-      <p:ext uri="{BB962C8B-B14F-4D97-AF65-F5344CB8AC3E}">
-        <p14:creationId xmlns:p14="http://schemas.microsoft.com/office/powerpoint/2010/main" val="4156384484"/>
-      </p:ext>
-    </p:extLst>
-  </p:cSld>
-  <p:clrMapOvr>
-    <a:masterClrMapping/>
-  </p:clrMapOvr>
-  <p:timing>
-    <p:tnLst>
-      <p:par>
-        <p:cTn id="1" dur="indefinite" restart="never" nodeType="tmRoot"/>
-      </p:par>
-    </p:tnLst>
-  </p:timing>
-</p:sld>
-</file>
-
-<file path=ppt/slides/slide2.xml><?xml version="1.0" encoding="utf-8"?>
-<p:sld xmlns:a="http://schemas.openxmlformats.org/drawingml/2006/main" xmlns:r="http://schemas.openxmlformats.org/officeDocument/2006/relationships" xmlns:p="http://schemas.openxmlformats.org/presentationml/2006/main">
-  <p:cSld>
-    <p:spTree>
-      <p:nvGrpSpPr>
-        <p:cNvPr id="1" name=""/>
-        <p:cNvGrpSpPr/>
-        <p:nvPr/>
-      </p:nvGrpSpPr>
-      <p:grpSpPr>
-        <a:xfrm>
-          <a:off x="0" y="0"/>
-          <a:ext cx="0" cy="0"/>
-          <a:chOff x="0" y="0"/>
-          <a:chExt cx="0" cy="0"/>
-        </a:xfrm>
-      </p:grpSpPr>
-      <p:sp>
-        <p:nvSpPr>
-          <p:cNvPr id="2" name="제목 1"/>
-          <p:cNvSpPr>
-            <a:spLocks noGrp="1"/>
-          </p:cNvSpPr>
-          <p:nvPr>
-            <p:ph type="title"/>
-          </p:nvPr>
-        </p:nvSpPr>
-        <p:spPr>
-          <a:xfrm>
-            <a:off x="457200" y="-20538"/>
-            <a:ext cx="8229600" cy="857250"/>
-          </a:xfrm>
-        </p:spPr>
-        <p:txBody>
-          <a:bodyPr/>
-          <a:lstStyle/>
-          <a:p>
-            <a:r>
-              <a:rPr lang="en-US" altLang="ko-KR" dirty="0" err="1" smtClean="0"/>
-              <a:t>MVC</a:t>
-            </a:r>
-            <a:r>
-              <a:rPr lang="en-US" altLang="ko-KR" dirty="0" smtClean="0"/>
-              <a:t> </a:t>
-            </a:r>
-            <a:r>
-              <a:rPr lang="en-US" altLang="ko-KR" dirty="0" smtClean="0"/>
-              <a:t>Model 1</a:t>
-            </a:r>
-            <a:r>
-              <a:rPr lang="en-US" altLang="ko-KR" dirty="0" smtClean="0"/>
-              <a:t> with </a:t>
-            </a:r>
-            <a:r>
-              <a:rPr lang="en-US" altLang="ko-KR" dirty="0" err="1" smtClean="0"/>
-              <a:t>JSP</a:t>
-            </a:r>
-            <a:r>
-              <a:rPr lang="en-US" altLang="ko-KR" dirty="0" smtClean="0"/>
-              <a:t>/Servlet</a:t>
-            </a:r>
-            <a:endParaRPr lang="ko-KR" altLang="en-US" dirty="0"/>
-          </a:p>
-        </p:txBody>
-      </p:sp>
-      <p:sp>
-        <p:nvSpPr>
-          <p:cNvPr id="21" name="모서리가 둥근 직사각형 20"/>
-          <p:cNvSpPr/>
-          <p:nvPr/>
-        </p:nvSpPr>
-        <p:spPr>
-          <a:xfrm>
-            <a:off x="611560" y="2427734"/>
-            <a:ext cx="1440160" cy="720080"/>
-          </a:xfrm>
-          <a:prstGeom prst="roundRect">
-            <a:avLst>
-              <a:gd name="adj" fmla="val 10708"/>
-            </a:avLst>
-          </a:prstGeom>
-        </p:spPr>
-        <p:style>
-          <a:lnRef idx="2">
-            <a:schemeClr val="dk1"/>
-          </a:lnRef>
-          <a:fillRef idx="1">
-            <a:schemeClr val="lt1"/>
-          </a:fillRef>
-          <a:effectRef idx="0">
-            <a:schemeClr val="dk1"/>
-          </a:effectRef>
-          <a:fontRef idx="minor">
-            <a:schemeClr val="dk1"/>
-          </a:fontRef>
-        </p:style>
-        <p:txBody>
-          <a:bodyPr rtlCol="0" anchor="ctr"/>
-          <a:lstStyle/>
-          <a:p>
-            <a:pPr algn="ctr"/>
-            <a:r>
-              <a:rPr lang="en-US" altLang="ko-KR" dirty="0" smtClean="0"/>
-              <a:t>Browser</a:t>
-            </a:r>
-            <a:endParaRPr lang="ko-KR" altLang="en-US" dirty="0"/>
-          </a:p>
-        </p:txBody>
-      </p:sp>
-      <p:sp>
-        <p:nvSpPr>
-          <p:cNvPr id="31" name="모서리가 둥근 직사각형 30"/>
-          <p:cNvSpPr/>
-          <p:nvPr/>
-        </p:nvSpPr>
-        <p:spPr>
-          <a:xfrm>
-            <a:off x="2483768" y="2427734"/>
-            <a:ext cx="2160240" cy="720080"/>
-          </a:xfrm>
-          <a:prstGeom prst="roundRect">
-            <a:avLst>
-              <a:gd name="adj" fmla="val 10708"/>
-            </a:avLst>
-          </a:prstGeom>
-        </p:spPr>
-        <p:style>
-          <a:lnRef idx="2">
-            <a:schemeClr val="dk1"/>
-          </a:lnRef>
-          <a:fillRef idx="1">
-            <a:schemeClr val="lt1"/>
-          </a:fillRef>
-          <a:effectRef idx="0">
-            <a:schemeClr val="dk1"/>
-          </a:effectRef>
-          <a:fontRef idx="minor">
-            <a:schemeClr val="dk1"/>
-          </a:fontRef>
-        </p:style>
-        <p:txBody>
-          <a:bodyPr rtlCol="0" anchor="ctr"/>
-          <a:lstStyle/>
-          <a:p>
-            <a:pPr algn="ctr"/>
-            <a:r>
-              <a:rPr lang="en-US" altLang="ko-KR" dirty="0" smtClean="0"/>
-              <a:t>Controller/View</a:t>
-            </a:r>
-          </a:p>
-          <a:p>
-            <a:pPr algn="ctr"/>
-            <a:r>
-              <a:rPr lang="en-US" altLang="ko-KR" dirty="0" smtClean="0"/>
-              <a:t>(</a:t>
-            </a:r>
-            <a:r>
-              <a:rPr lang="en-US" altLang="ko-KR" dirty="0" err="1" smtClean="0"/>
-              <a:t>JSP</a:t>
-            </a:r>
-            <a:r>
-              <a:rPr lang="en-US" altLang="ko-KR" dirty="0" smtClean="0"/>
-              <a:t>)</a:t>
-            </a:r>
-            <a:endParaRPr lang="ko-KR" altLang="en-US" dirty="0"/>
-          </a:p>
-        </p:txBody>
-      </p:sp>
-      <p:sp>
-        <p:nvSpPr>
-          <p:cNvPr id="33" name="모서리가 둥근 직사각형 32"/>
-          <p:cNvSpPr/>
-          <p:nvPr/>
-        </p:nvSpPr>
-        <p:spPr>
-          <a:xfrm>
-            <a:off x="5076056" y="2427734"/>
-            <a:ext cx="1440160" cy="720080"/>
-          </a:xfrm>
-          <a:prstGeom prst="roundRect">
-            <a:avLst>
-              <a:gd name="adj" fmla="val 10708"/>
-            </a:avLst>
-          </a:prstGeom>
-        </p:spPr>
-        <p:style>
-          <a:lnRef idx="2">
-            <a:schemeClr val="dk1"/>
-          </a:lnRef>
-          <a:fillRef idx="1">
-            <a:schemeClr val="lt1"/>
-          </a:fillRef>
-          <a:effectRef idx="0">
-            <a:schemeClr val="dk1"/>
-          </a:effectRef>
-          <a:fontRef idx="minor">
-            <a:schemeClr val="dk1"/>
-          </a:fontRef>
-        </p:style>
-        <p:txBody>
-          <a:bodyPr rtlCol="0" anchor="ctr"/>
-          <a:lstStyle/>
-          <a:p>
-            <a:pPr algn="ctr"/>
-            <a:r>
-              <a:rPr lang="en-US" altLang="ko-KR" dirty="0" smtClean="0"/>
-              <a:t>Java Bean</a:t>
-            </a:r>
-            <a:endParaRPr lang="ko-KR" altLang="en-US" dirty="0"/>
-          </a:p>
-        </p:txBody>
-      </p:sp>
-      <p:sp>
-        <p:nvSpPr>
-          <p:cNvPr id="34" name="모서리가 둥근 직사각형 33"/>
-          <p:cNvSpPr/>
-          <p:nvPr/>
-        </p:nvSpPr>
-        <p:spPr>
-          <a:xfrm>
-            <a:off x="6948264" y="2427734"/>
-            <a:ext cx="1440160" cy="720080"/>
-          </a:xfrm>
-          <a:prstGeom prst="roundRect">
-            <a:avLst>
-              <a:gd name="adj" fmla="val 10708"/>
-            </a:avLst>
-          </a:prstGeom>
-        </p:spPr>
-        <p:style>
-          <a:lnRef idx="2">
-            <a:schemeClr val="dk1"/>
-          </a:lnRef>
-          <a:fillRef idx="1">
-            <a:schemeClr val="lt1"/>
-          </a:fillRef>
-          <a:effectRef idx="0">
-            <a:schemeClr val="dk1"/>
-          </a:effectRef>
-          <a:fontRef idx="minor">
-            <a:schemeClr val="dk1"/>
-          </a:fontRef>
-        </p:style>
-        <p:txBody>
-          <a:bodyPr rtlCol="0" anchor="ctr"/>
-          <a:lstStyle/>
-          <a:p>
-            <a:pPr algn="ctr"/>
-            <a:r>
-              <a:rPr lang="en-US" altLang="ko-KR" dirty="0" smtClean="0"/>
-              <a:t>Model</a:t>
-            </a:r>
-            <a:br>
-              <a:rPr lang="en-US" altLang="ko-KR" dirty="0" smtClean="0"/>
-            </a:br>
-            <a:r>
-              <a:rPr lang="en-US" altLang="ko-KR" dirty="0" smtClean="0"/>
-              <a:t>(DB)</a:t>
-            </a:r>
-            <a:endParaRPr lang="ko-KR" altLang="en-US" dirty="0"/>
-          </a:p>
-        </p:txBody>
-      </p:sp>
-    </p:spTree>
-    <p:extLst>
-      <p:ext uri="{BB962C8B-B14F-4D97-AF65-F5344CB8AC3E}">
-        <p14:creationId xmlns:p14="http://schemas.microsoft.com/office/powerpoint/2010/main" val="3679793549"/>
-      </p:ext>
-    </p:extLst>
-  </p:cSld>
-  <p:clrMapOvr>
-    <a:masterClrMapping/>
-  </p:clrMapOvr>
-  <p:timing>
-    <p:tnLst>
-      <p:par>
-        <p:cTn id="1" dur="indefinite" restart="never" nodeType="tmRoot"/>
-      </p:par>
-    </p:tnLst>
-  </p:timing>
-</p:sld>
-</file>
-
-<file path=ppt/slides/slide3.xml><?xml version="1.0" encoding="utf-8"?>
-<p:sld xmlns:a="http://schemas.openxmlformats.org/drawingml/2006/main" xmlns:r="http://schemas.openxmlformats.org/officeDocument/2006/relationships" xmlns:p="http://schemas.openxmlformats.org/presentationml/2006/main">
-  <p:cSld>
-    <p:spTree>
-      <p:nvGrpSpPr>
-        <p:cNvPr id="1" name=""/>
-        <p:cNvGrpSpPr/>
-        <p:nvPr/>
-      </p:nvGrpSpPr>
-      <p:grpSpPr>
-        <a:xfrm>
-          <a:off x="0" y="0"/>
-          <a:ext cx="0" cy="0"/>
-          <a:chOff x="0" y="0"/>
-          <a:chExt cx="0" cy="0"/>
-        </a:xfrm>
-      </p:grpSpPr>
-      <p:sp>
-        <p:nvSpPr>
-          <p:cNvPr id="2" name="제목 1"/>
-          <p:cNvSpPr>
-            <a:spLocks noGrp="1"/>
-          </p:cNvSpPr>
-          <p:nvPr>
-            <p:ph type="title"/>
-          </p:nvPr>
-        </p:nvSpPr>
-        <p:spPr>
-          <a:xfrm>
-            <a:off x="457200" y="-20538"/>
-            <a:ext cx="8229600" cy="857250"/>
-          </a:xfrm>
-        </p:spPr>
-        <p:txBody>
-          <a:bodyPr/>
-          <a:lstStyle/>
-          <a:p>
-            <a:r>
-              <a:rPr lang="en-US" altLang="ko-KR" dirty="0" err="1" smtClean="0"/>
-              <a:t>MVC</a:t>
-            </a:r>
-            <a:r>
-              <a:rPr lang="en-US" altLang="ko-KR" dirty="0" smtClean="0"/>
-              <a:t> </a:t>
-            </a:r>
-            <a:r>
-              <a:rPr lang="en-US" altLang="ko-KR" dirty="0" smtClean="0"/>
-              <a:t>Model 2</a:t>
-            </a:r>
-            <a:r>
-              <a:rPr lang="en-US" altLang="ko-KR" dirty="0" smtClean="0"/>
-              <a:t> with </a:t>
-            </a:r>
-            <a:r>
-              <a:rPr lang="en-US" altLang="ko-KR" dirty="0" err="1" smtClean="0"/>
-              <a:t>JSP</a:t>
-            </a:r>
-            <a:r>
-              <a:rPr lang="en-US" altLang="ko-KR" dirty="0" smtClean="0"/>
-              <a:t>/Servlet</a:t>
-            </a:r>
-            <a:endParaRPr lang="ko-KR" altLang="en-US" dirty="0"/>
-          </a:p>
-        </p:txBody>
-      </p:sp>
-      <p:sp>
-        <p:nvSpPr>
-          <p:cNvPr id="21" name="모서리가 둥근 직사각형 20"/>
-          <p:cNvSpPr/>
-          <p:nvPr/>
-        </p:nvSpPr>
-        <p:spPr>
-          <a:xfrm>
-            <a:off x="539552" y="2427734"/>
-            <a:ext cx="1440160" cy="720080"/>
-          </a:xfrm>
-          <a:prstGeom prst="roundRect">
-            <a:avLst>
-              <a:gd name="adj" fmla="val 10708"/>
-            </a:avLst>
-          </a:prstGeom>
-        </p:spPr>
-        <p:style>
-          <a:lnRef idx="2">
-            <a:schemeClr val="dk1"/>
-          </a:lnRef>
-          <a:fillRef idx="1">
-            <a:schemeClr val="lt1"/>
-          </a:fillRef>
-          <a:effectRef idx="0">
-            <a:schemeClr val="dk1"/>
-          </a:effectRef>
-          <a:fontRef idx="minor">
-            <a:schemeClr val="dk1"/>
-          </a:fontRef>
-        </p:style>
-        <p:txBody>
-          <a:bodyPr rtlCol="0" anchor="ctr"/>
-          <a:lstStyle/>
-          <a:p>
-            <a:pPr algn="ctr"/>
-            <a:r>
-              <a:rPr lang="en-US" altLang="ko-KR" dirty="0" smtClean="0"/>
-              <a:t>Browser</a:t>
-            </a:r>
-            <a:endParaRPr lang="ko-KR" altLang="en-US" dirty="0"/>
-          </a:p>
-        </p:txBody>
-      </p:sp>
-      <p:sp>
-        <p:nvSpPr>
-          <p:cNvPr id="31" name="모서리가 둥근 직사각형 30"/>
-          <p:cNvSpPr/>
-          <p:nvPr/>
-        </p:nvSpPr>
-        <p:spPr>
-          <a:xfrm>
-            <a:off x="2627784" y="1752414"/>
-            <a:ext cx="1440160" cy="720080"/>
-          </a:xfrm>
-          <a:prstGeom prst="roundRect">
-            <a:avLst>
-              <a:gd name="adj" fmla="val 10708"/>
-            </a:avLst>
-          </a:prstGeom>
-        </p:spPr>
-        <p:style>
-          <a:lnRef idx="2">
-            <a:schemeClr val="dk1"/>
-          </a:lnRef>
-          <a:fillRef idx="1">
-            <a:schemeClr val="lt1"/>
-          </a:fillRef>
-          <a:effectRef idx="0">
-            <a:schemeClr val="dk1"/>
-          </a:effectRef>
-          <a:fontRef idx="minor">
-            <a:schemeClr val="dk1"/>
-          </a:fontRef>
-        </p:style>
-        <p:txBody>
-          <a:bodyPr rtlCol="0" anchor="ctr"/>
-          <a:lstStyle/>
-          <a:p>
-            <a:pPr algn="ctr"/>
-            <a:r>
-              <a:rPr lang="en-US" altLang="ko-KR" dirty="0" smtClean="0"/>
-              <a:t>Controller</a:t>
-            </a:r>
-          </a:p>
-          <a:p>
-            <a:pPr algn="ctr"/>
-            <a:r>
-              <a:rPr lang="en-US" altLang="ko-KR" dirty="0" smtClean="0"/>
-              <a:t>(Servlet)</a:t>
-            </a:r>
-            <a:endParaRPr lang="ko-KR" altLang="en-US" dirty="0"/>
-          </a:p>
-        </p:txBody>
-      </p:sp>
-      <p:sp>
-        <p:nvSpPr>
-          <p:cNvPr id="32" name="모서리가 둥근 직사각형 31"/>
-          <p:cNvSpPr/>
-          <p:nvPr/>
-        </p:nvSpPr>
-        <p:spPr>
-          <a:xfrm>
-            <a:off x="2627784" y="3075806"/>
-            <a:ext cx="1440160" cy="720080"/>
-          </a:xfrm>
-          <a:prstGeom prst="roundRect">
-            <a:avLst>
-              <a:gd name="adj" fmla="val 10708"/>
-            </a:avLst>
-          </a:prstGeom>
-        </p:spPr>
-        <p:style>
-          <a:lnRef idx="2">
-            <a:schemeClr val="dk1"/>
-          </a:lnRef>
-          <a:fillRef idx="1">
-            <a:schemeClr val="lt1"/>
-          </a:fillRef>
-          <a:effectRef idx="0">
-            <a:schemeClr val="dk1"/>
-          </a:effectRef>
-          <a:fontRef idx="minor">
-            <a:schemeClr val="dk1"/>
-          </a:fontRef>
-        </p:style>
-        <p:txBody>
-          <a:bodyPr rtlCol="0" anchor="ctr"/>
-          <a:lstStyle/>
-          <a:p>
-            <a:pPr algn="ctr"/>
-            <a:r>
-              <a:rPr lang="en-US" altLang="ko-KR" dirty="0" smtClean="0"/>
-              <a:t>View</a:t>
-            </a:r>
-          </a:p>
-          <a:p>
-            <a:pPr algn="ctr"/>
-            <a:r>
-              <a:rPr lang="en-US" altLang="ko-KR" dirty="0" smtClean="0"/>
-              <a:t>(</a:t>
-            </a:r>
-            <a:r>
-              <a:rPr lang="en-US" altLang="ko-KR" dirty="0" err="1" smtClean="0"/>
-              <a:t>JSP</a:t>
-            </a:r>
-            <a:r>
-              <a:rPr lang="en-US" altLang="ko-KR" dirty="0" smtClean="0"/>
-              <a:t>)</a:t>
-            </a:r>
-            <a:endParaRPr lang="ko-KR" altLang="en-US" dirty="0"/>
-          </a:p>
-        </p:txBody>
-      </p:sp>
-      <p:sp>
-        <p:nvSpPr>
-          <p:cNvPr id="33" name="모서리가 둥근 직사각형 32"/>
-          <p:cNvSpPr/>
-          <p:nvPr/>
-        </p:nvSpPr>
-        <p:spPr>
-          <a:xfrm>
-            <a:off x="4788024" y="2427734"/>
-            <a:ext cx="1440160" cy="720080"/>
-          </a:xfrm>
-          <a:prstGeom prst="roundRect">
-            <a:avLst>
-              <a:gd name="adj" fmla="val 10708"/>
-            </a:avLst>
-          </a:prstGeom>
-        </p:spPr>
-        <p:style>
-          <a:lnRef idx="2">
-            <a:schemeClr val="dk1"/>
-          </a:lnRef>
-          <a:fillRef idx="1">
-            <a:schemeClr val="lt1"/>
-          </a:fillRef>
-          <a:effectRef idx="0">
-            <a:schemeClr val="dk1"/>
-          </a:effectRef>
-          <a:fontRef idx="minor">
-            <a:schemeClr val="dk1"/>
-          </a:fontRef>
-        </p:style>
-        <p:txBody>
-          <a:bodyPr rtlCol="0" anchor="ctr"/>
-          <a:lstStyle/>
-          <a:p>
-            <a:pPr algn="ctr"/>
-            <a:r>
-              <a:rPr lang="en-US" altLang="ko-KR" dirty="0" smtClean="0"/>
-              <a:t>Java Bean</a:t>
-            </a:r>
-            <a:endParaRPr lang="ko-KR" altLang="en-US" dirty="0"/>
-          </a:p>
-        </p:txBody>
-      </p:sp>
-      <p:sp>
-        <p:nvSpPr>
-          <p:cNvPr id="34" name="모서리가 둥근 직사각형 33"/>
-          <p:cNvSpPr/>
-          <p:nvPr/>
-        </p:nvSpPr>
-        <p:spPr>
-          <a:xfrm>
-            <a:off x="6948264" y="2427734"/>
-            <a:ext cx="1440160" cy="720080"/>
-          </a:xfrm>
-          <a:prstGeom prst="roundRect">
-            <a:avLst>
-              <a:gd name="adj" fmla="val 10708"/>
-            </a:avLst>
-          </a:prstGeom>
-        </p:spPr>
-        <p:style>
-          <a:lnRef idx="2">
-            <a:schemeClr val="dk1"/>
-          </a:lnRef>
-          <a:fillRef idx="1">
-            <a:schemeClr val="lt1"/>
-          </a:fillRef>
-          <a:effectRef idx="0">
-            <a:schemeClr val="dk1"/>
-          </a:effectRef>
-          <a:fontRef idx="minor">
-            <a:schemeClr val="dk1"/>
-          </a:fontRef>
-        </p:style>
-        <p:txBody>
-          <a:bodyPr rtlCol="0" anchor="ctr"/>
-          <a:lstStyle/>
-          <a:p>
-            <a:pPr algn="ctr"/>
-            <a:r>
-              <a:rPr lang="en-US" altLang="ko-KR" dirty="0" smtClean="0"/>
-              <a:t>Model</a:t>
-            </a:r>
-            <a:br>
-              <a:rPr lang="en-US" altLang="ko-KR" dirty="0" smtClean="0"/>
-            </a:br>
-            <a:r>
-              <a:rPr lang="en-US" altLang="ko-KR" dirty="0" smtClean="0"/>
-              <a:t>(DB)</a:t>
-            </a:r>
-            <a:endParaRPr lang="ko-KR" altLang="en-US" dirty="0"/>
-          </a:p>
-        </p:txBody>
-      </p:sp>
-    </p:spTree>
-    <p:extLst>
-      <p:ext uri="{BB962C8B-B14F-4D97-AF65-F5344CB8AC3E}">
-        <p14:creationId xmlns:p14="http://schemas.microsoft.com/office/powerpoint/2010/main" val="2119802702"/>
-      </p:ext>
-    </p:extLst>
-  </p:cSld>
-  <p:clrMapOvr>
-    <a:masterClrMapping/>
-  </p:clrMapOvr>
-  <p:timing>
-    <p:tnLst>
-      <p:par>
-        <p:cTn id="1" dur="indefinite" restart="never" nodeType="tmRoot"/>
-      </p:par>
-    </p:tnLst>
-  </p:timing>
-</p:sld>
-</file>
-
-<file path=ppt/slides/slide4.xml><?xml version="1.0" encoding="utf-8"?>
-<p:sld xmlns:a="http://schemas.openxmlformats.org/drawingml/2006/main" xmlns:r="http://schemas.openxmlformats.org/officeDocument/2006/relationships" xmlns:p="http://schemas.openxmlformats.org/presentationml/2006/main">
-  <p:cSld>
-    <p:spTree>
-      <p:nvGrpSpPr>
-        <p:cNvPr id="1" name=""/>
-        <p:cNvGrpSpPr/>
-        <p:nvPr/>
-      </p:nvGrpSpPr>
-      <p:grpSpPr>
-        <a:xfrm>
-          <a:off x="0" y="0"/>
-          <a:ext cx="0" cy="0"/>
-          <a:chOff x="0" y="0"/>
-          <a:chExt cx="0" cy="0"/>
-        </a:xfrm>
-      </p:grpSpPr>
-      <p:sp>
-        <p:nvSpPr>
-          <p:cNvPr id="2" name="제목 1"/>
-          <p:cNvSpPr>
-            <a:spLocks noGrp="1"/>
-          </p:cNvSpPr>
-          <p:nvPr>
-            <p:ph type="title"/>
-          </p:nvPr>
-        </p:nvSpPr>
-        <p:spPr>
-          <a:xfrm>
-            <a:off x="457200" y="-20538"/>
-            <a:ext cx="8229600" cy="857250"/>
-          </a:xfrm>
-        </p:spPr>
-        <p:txBody>
-          <a:bodyPr/>
-          <a:lstStyle/>
-          <a:p>
-            <a:r>
-              <a:rPr lang="en-US" altLang="ko-KR" dirty="0" smtClean="0"/>
-              <a:t>MVP </a:t>
-            </a:r>
-            <a:r>
-              <a:rPr lang="en-US" altLang="ko-KR" dirty="0" smtClean="0"/>
-              <a:t>Pattern</a:t>
-            </a:r>
-            <a:endParaRPr lang="ko-KR" altLang="en-US" dirty="0"/>
-          </a:p>
-        </p:txBody>
-      </p:sp>
-      <p:sp>
-        <p:nvSpPr>
-          <p:cNvPr id="4" name="모서리가 둥근 직사각형 3"/>
-          <p:cNvSpPr/>
-          <p:nvPr/>
-        </p:nvSpPr>
-        <p:spPr>
-          <a:xfrm>
-            <a:off x="3419872" y="3795886"/>
-            <a:ext cx="1872208" cy="936104"/>
-          </a:xfrm>
-          <a:prstGeom prst="roundRect">
-            <a:avLst>
-              <a:gd name="adj" fmla="val 10708"/>
-            </a:avLst>
-          </a:prstGeom>
-        </p:spPr>
-        <p:style>
-          <a:lnRef idx="2">
-            <a:schemeClr val="dk1"/>
-          </a:lnRef>
-          <a:fillRef idx="1">
-            <a:schemeClr val="lt1"/>
-          </a:fillRef>
-          <a:effectRef idx="0">
-            <a:schemeClr val="dk1"/>
-          </a:effectRef>
-          <a:fontRef idx="minor">
-            <a:schemeClr val="dk1"/>
-          </a:fontRef>
-        </p:style>
-        <p:txBody>
-          <a:bodyPr rtlCol="0" anchor="ctr"/>
-          <a:lstStyle/>
-          <a:p>
-            <a:pPr algn="ctr"/>
-            <a:r>
-              <a:rPr lang="en-US" altLang="ko-KR" dirty="0" smtClean="0"/>
-              <a:t>Model</a:t>
-            </a:r>
-            <a:endParaRPr lang="ko-KR" altLang="en-US" dirty="0"/>
-          </a:p>
-        </p:txBody>
-      </p:sp>
-      <p:sp>
-        <p:nvSpPr>
-          <p:cNvPr id="23" name="모서리가 둥근 직사각형 22"/>
-          <p:cNvSpPr/>
-          <p:nvPr/>
-        </p:nvSpPr>
-        <p:spPr>
-          <a:xfrm>
-            <a:off x="971600" y="2643758"/>
-            <a:ext cx="1872208" cy="936104"/>
-          </a:xfrm>
-          <a:prstGeom prst="roundRect">
-            <a:avLst>
-              <a:gd name="adj" fmla="val 10708"/>
-            </a:avLst>
-          </a:prstGeom>
-        </p:spPr>
-        <p:style>
-          <a:lnRef idx="2">
-            <a:schemeClr val="dk1"/>
-          </a:lnRef>
-          <a:fillRef idx="1">
-            <a:schemeClr val="lt1"/>
-          </a:fillRef>
-          <a:effectRef idx="0">
-            <a:schemeClr val="dk1"/>
-          </a:effectRef>
-          <a:fontRef idx="minor">
-            <a:schemeClr val="dk1"/>
-          </a:fontRef>
-        </p:style>
-        <p:txBody>
-          <a:bodyPr rtlCol="0" anchor="ctr"/>
-          <a:lstStyle/>
-          <a:p>
-            <a:pPr algn="ctr"/>
-            <a:r>
-              <a:rPr lang="en-US" altLang="ko-KR" dirty="0" smtClean="0"/>
-              <a:t>Present</a:t>
-            </a:r>
-            <a:endParaRPr lang="ko-KR" altLang="en-US" dirty="0"/>
-          </a:p>
-        </p:txBody>
-      </p:sp>
-      <p:sp>
-        <p:nvSpPr>
-          <p:cNvPr id="29" name="모서리가 둥근 직사각형 28"/>
-          <p:cNvSpPr/>
-          <p:nvPr/>
-        </p:nvSpPr>
-        <p:spPr>
-          <a:xfrm>
-            <a:off x="3438488" y="1320918"/>
-            <a:ext cx="1872208" cy="936104"/>
-          </a:xfrm>
-          <a:prstGeom prst="roundRect">
-            <a:avLst>
-              <a:gd name="adj" fmla="val 10708"/>
-            </a:avLst>
-          </a:prstGeom>
-        </p:spPr>
-        <p:style>
-          <a:lnRef idx="2">
-            <a:schemeClr val="dk1"/>
-          </a:lnRef>
-          <a:fillRef idx="1">
-            <a:schemeClr val="lt1"/>
-          </a:fillRef>
-          <a:effectRef idx="0">
-            <a:schemeClr val="dk1"/>
-          </a:effectRef>
-          <a:fontRef idx="minor">
-            <a:schemeClr val="dk1"/>
-          </a:fontRef>
-        </p:style>
-        <p:txBody>
-          <a:bodyPr rtlCol="0" anchor="ctr"/>
-          <a:lstStyle/>
-          <a:p>
-            <a:pPr algn="ctr"/>
-            <a:r>
-              <a:rPr lang="en-US" altLang="ko-KR" dirty="0" smtClean="0"/>
-              <a:t>View</a:t>
-            </a:r>
-            <a:endParaRPr lang="ko-KR" altLang="en-US" dirty="0"/>
-          </a:p>
-        </p:txBody>
-      </p:sp>
-      <p:cxnSp>
-        <p:nvCxnSpPr>
-          <p:cNvPr id="30" name="직선 화살표 연결선 29"/>
-          <p:cNvCxnSpPr/>
-          <p:nvPr/>
-        </p:nvCxnSpPr>
-        <p:spPr>
-          <a:xfrm>
-            <a:off x="5310696" y="1601788"/>
-            <a:ext cx="1741326" cy="0"/>
-          </a:xfrm>
-          <a:prstGeom prst="straightConnector1">
-            <a:avLst/>
-          </a:prstGeom>
-          <a:ln w="28575">
-            <a:solidFill>
-              <a:schemeClr val="tx1"/>
-            </a:solidFill>
-            <a:headEnd type="arrow" w="med" len="med"/>
-            <a:tailEnd type="none" w="med" len="med"/>
-          </a:ln>
-        </p:spPr>
-        <p:style>
-          <a:lnRef idx="1">
-            <a:schemeClr val="accent1"/>
-          </a:lnRef>
-          <a:fillRef idx="0">
-            <a:schemeClr val="accent1"/>
-          </a:fillRef>
-          <a:effectRef idx="0">
-            <a:schemeClr val="accent1"/>
-          </a:effectRef>
-          <a:fontRef idx="minor">
-            <a:schemeClr val="tx1"/>
-          </a:fontRef>
-        </p:style>
-      </p:cxnSp>
-      <p:sp>
-        <p:nvSpPr>
-          <p:cNvPr id="40" name="모서리가 둥근 직사각형 39"/>
-          <p:cNvSpPr/>
-          <p:nvPr/>
-        </p:nvSpPr>
-        <p:spPr>
-          <a:xfrm>
-            <a:off x="5179814" y="1275606"/>
-            <a:ext cx="2082441" cy="307132"/>
-          </a:xfrm>
-          <a:prstGeom prst="roundRect">
-            <a:avLst>
-              <a:gd name="adj" fmla="val 18148"/>
-            </a:avLst>
-          </a:prstGeom>
-          <a:noFill/>
-          <a:ln>
-            <a:noFill/>
-          </a:ln>
-        </p:spPr>
-        <p:style>
-          <a:lnRef idx="2">
-            <a:schemeClr val="dk1"/>
-          </a:lnRef>
-          <a:fillRef idx="1">
-            <a:schemeClr val="lt1"/>
-          </a:fillRef>
-          <a:effectRef idx="0">
-            <a:schemeClr val="dk1"/>
-          </a:effectRef>
-          <a:fontRef idx="minor">
-            <a:schemeClr val="dk1"/>
-          </a:fontRef>
-        </p:style>
-        <p:txBody>
-          <a:bodyPr rtlCol="0" anchor="ctr"/>
-          <a:lstStyle/>
-          <a:p>
-            <a:pPr algn="ctr"/>
-            <a:r>
-              <a:rPr lang="en-US" altLang="ko-KR" sz="1400" b="1" dirty="0" smtClean="0"/>
-              <a:t>User Request</a:t>
-            </a:r>
-            <a:endParaRPr lang="en-US" altLang="ko-KR" sz="1400" b="1" dirty="0" smtClean="0"/>
-          </a:p>
-        </p:txBody>
-      </p:sp>
-      <p:sp>
-        <p:nvSpPr>
-          <p:cNvPr id="10" name="자유형 9"/>
-          <p:cNvSpPr/>
-          <p:nvPr/>
-        </p:nvSpPr>
-        <p:spPr>
-          <a:xfrm>
-            <a:off x="1691680" y="1612991"/>
-            <a:ext cx="1746808" cy="1030767"/>
+          <a:xfrm flipV="1">
+            <a:off x="2385801" y="3435846"/>
+            <a:ext cx="1368152" cy="612068"/>
           </a:xfrm>
           <a:custGeom>
             <a:avLst/>
@@ -5674,52 +6450,15 @@
           </a:p>
         </p:txBody>
       </p:sp>
-      <p:cxnSp>
-        <p:nvCxnSpPr>
-          <p:cNvPr id="45" name="직선 화살표 연결선 44"/>
-          <p:cNvCxnSpPr/>
-          <p:nvPr/>
-        </p:nvCxnSpPr>
-        <p:spPr>
-          <a:xfrm flipH="1">
-            <a:off x="5310696" y="1889820"/>
-            <a:ext cx="1741326" cy="0"/>
-          </a:xfrm>
-          <a:prstGeom prst="straightConnector1">
-            <a:avLst/>
-          </a:prstGeom>
-          <a:ln w="28575">
-            <a:solidFill>
-              <a:schemeClr val="tx1"/>
-            </a:solidFill>
-            <a:headEnd type="arrow" w="med" len="med"/>
-            <a:tailEnd type="none" w="med" len="med"/>
-          </a:ln>
-        </p:spPr>
-        <p:style>
-          <a:lnRef idx="1">
-            <a:schemeClr val="accent1"/>
-          </a:lnRef>
-          <a:fillRef idx="0">
-            <a:schemeClr val="accent1"/>
-          </a:fillRef>
-          <a:effectRef idx="0">
-            <a:schemeClr val="accent1"/>
-          </a:effectRef>
-          <a:fontRef idx="minor">
-            <a:schemeClr val="tx1"/>
-          </a:fontRef>
-        </p:style>
-      </p:cxnSp>
-      <p:sp>
-        <p:nvSpPr>
-          <p:cNvPr id="47" name="모서리가 둥근 직사각형 46"/>
+      <p:sp>
+        <p:nvSpPr>
+          <p:cNvPr id="24" name="모서리가 둥근 직사각형 23"/>
           <p:cNvSpPr/>
           <p:nvPr/>
         </p:nvSpPr>
         <p:spPr>
           <a:xfrm>
-            <a:off x="5179814" y="1915220"/>
+            <a:off x="2025761" y="3704778"/>
             <a:ext cx="2082441" cy="307132"/>
           </a:xfrm>
           <a:prstGeom prst="roundRect">
@@ -5753,7 +6492,7 @@
             <a:pPr algn="ctr"/>
             <a:r>
               <a:rPr lang="en-US" altLang="ko-KR" sz="1400" b="1" dirty="0" smtClean="0"/>
-              <a:t>User Response</a:t>
+              <a:t>Event</a:t>
             </a:r>
             <a:endParaRPr lang="en-US" altLang="ko-KR" sz="1400" b="1" dirty="0" smtClean="0"/>
           </a:p>
@@ -5761,92 +6500,13 @@
       </p:sp>
       <p:sp>
         <p:nvSpPr>
-          <p:cNvPr id="52" name="자유형 51"/>
+          <p:cNvPr id="25" name="모서리가 둥근 직사각형 24"/>
           <p:cNvSpPr/>
           <p:nvPr/>
         </p:nvSpPr>
         <p:spPr>
-          <a:xfrm flipV="1">
-            <a:off x="1691680" y="3579862"/>
-            <a:ext cx="1728192" cy="936104"/>
-          </a:xfrm>
-          <a:custGeom>
-            <a:avLst/>
-            <a:gdLst>
-              <a:gd name="connsiteX0" fmla="*/ 1127982 w 1127982"/>
-              <a:gd name="connsiteY0" fmla="*/ 0 h 1014517"/>
-              <a:gd name="connsiteX1" fmla="*/ 0 w 1127982"/>
-              <a:gd name="connsiteY1" fmla="*/ 0 h 1014517"/>
-              <a:gd name="connsiteX2" fmla="*/ 0 w 1127982"/>
-              <a:gd name="connsiteY2" fmla="*/ 1014517 h 1014517"/>
-            </a:gdLst>
-            <a:ahLst/>
-            <a:cxnLst>
-              <a:cxn ang="0">
-                <a:pos x="connsiteX0" y="connsiteY0"/>
-              </a:cxn>
-              <a:cxn ang="0">
-                <a:pos x="connsiteX1" y="connsiteY1"/>
-              </a:cxn>
-              <a:cxn ang="0">
-                <a:pos x="connsiteX2" y="connsiteY2"/>
-              </a:cxn>
-            </a:cxnLst>
-            <a:rect l="l" t="t" r="r" b="b"/>
-            <a:pathLst>
-              <a:path w="1127982" h="1014517">
-                <a:moveTo>
-                  <a:pt x="1127982" y="0"/>
-                </a:moveTo>
-                <a:lnTo>
-                  <a:pt x="0" y="0"/>
-                </a:lnTo>
-                <a:lnTo>
-                  <a:pt x="0" y="1014517"/>
-                </a:lnTo>
-              </a:path>
-            </a:pathLst>
-          </a:custGeom>
-          <a:ln w="28575">
-            <a:solidFill>
-              <a:schemeClr val="tx1"/>
-            </a:solidFill>
-            <a:headEnd type="arrow" w="med" len="med"/>
-            <a:tailEnd type="none" w="med" len="med"/>
-          </a:ln>
-        </p:spPr>
-        <p:style>
-          <a:lnRef idx="1">
-            <a:schemeClr val="accent1"/>
-          </a:lnRef>
-          <a:fillRef idx="0">
-            <a:schemeClr val="accent1"/>
-          </a:fillRef>
-          <a:effectRef idx="0">
-            <a:schemeClr val="accent1"/>
-          </a:effectRef>
-          <a:fontRef idx="minor">
-            <a:schemeClr val="tx1"/>
-          </a:fontRef>
-        </p:style>
-        <p:txBody>
-          <a:bodyPr rtlCol="0" anchor="ctr"/>
-          <a:lstStyle/>
-          <a:p>
-            <a:pPr algn="ctr"/>
-            <a:endParaRPr lang="ko-KR" altLang="en-US"/>
-          </a:p>
-        </p:txBody>
-      </p:sp>
-      <p:sp>
-        <p:nvSpPr>
-          <p:cNvPr id="57" name="모서리가 둥근 직사각형 56"/>
-          <p:cNvSpPr/>
-          <p:nvPr/>
-        </p:nvSpPr>
-        <p:spPr>
-          <a:xfrm>
-            <a:off x="1475656" y="1275606"/>
+          <a:xfrm>
+            <a:off x="2025761" y="1817762"/>
             <a:ext cx="2082441" cy="307132"/>
           </a:xfrm>
           <a:prstGeom prst="roundRect">
@@ -5880,311 +6540,8 @@
             <a:pPr algn="ctr"/>
             <a:r>
               <a:rPr lang="en-US" altLang="ko-KR" sz="1400" b="1" dirty="0" smtClean="0"/>
-              <a:t>Pass Request</a:t>
-            </a:r>
-            <a:endParaRPr lang="en-US" altLang="ko-KR" sz="1400" b="1" dirty="0" smtClean="0"/>
-          </a:p>
-        </p:txBody>
-      </p:sp>
-      <p:sp>
-        <p:nvSpPr>
-          <p:cNvPr id="58" name="모서리가 둥근 직사각형 57"/>
-          <p:cNvSpPr/>
-          <p:nvPr/>
-        </p:nvSpPr>
-        <p:spPr>
-          <a:xfrm>
-            <a:off x="1547664" y="4515966"/>
-            <a:ext cx="2082441" cy="307132"/>
-          </a:xfrm>
-          <a:prstGeom prst="roundRect">
-            <a:avLst>
-              <a:gd name="adj" fmla="val 18148"/>
-            </a:avLst>
-          </a:prstGeom>
-          <a:noFill/>
-          <a:ln>
-            <a:noFill/>
-          </a:ln>
-        </p:spPr>
-        <p:style>
-          <a:lnRef idx="2">
-            <a:schemeClr val="dk1"/>
-          </a:lnRef>
-          <a:fillRef idx="1">
-            <a:schemeClr val="lt1"/>
-          </a:fillRef>
-          <a:effectRef idx="0">
-            <a:schemeClr val="dk1"/>
-          </a:effectRef>
-          <a:fontRef idx="minor">
-            <a:schemeClr val="dk1"/>
-          </a:fontRef>
-        </p:style>
-        <p:txBody>
-          <a:bodyPr rtlCol="0" anchor="ctr"/>
-          <a:lstStyle/>
-          <a:p>
-            <a:pPr algn="ctr"/>
-            <a:r>
-              <a:rPr lang="en-US" altLang="ko-KR" sz="1400" b="1" dirty="0" smtClean="0"/>
-              <a:t>Update Data</a:t>
-            </a:r>
-            <a:endParaRPr lang="en-US" altLang="ko-KR" sz="1400" b="1" dirty="0" smtClean="0"/>
-          </a:p>
-        </p:txBody>
-      </p:sp>
-      <p:sp>
-        <p:nvSpPr>
-          <p:cNvPr id="19" name="자유형 18"/>
-          <p:cNvSpPr/>
-          <p:nvPr/>
-        </p:nvSpPr>
-        <p:spPr>
-          <a:xfrm>
-            <a:off x="2051720" y="1923678"/>
-            <a:ext cx="1386768" cy="720079"/>
-          </a:xfrm>
-          <a:custGeom>
-            <a:avLst/>
-            <a:gdLst>
-              <a:gd name="connsiteX0" fmla="*/ 1127982 w 1127982"/>
-              <a:gd name="connsiteY0" fmla="*/ 0 h 1014517"/>
-              <a:gd name="connsiteX1" fmla="*/ 0 w 1127982"/>
-              <a:gd name="connsiteY1" fmla="*/ 0 h 1014517"/>
-              <a:gd name="connsiteX2" fmla="*/ 0 w 1127982"/>
-              <a:gd name="connsiteY2" fmla="*/ 1014517 h 1014517"/>
-            </a:gdLst>
-            <a:ahLst/>
-            <a:cxnLst>
-              <a:cxn ang="0">
-                <a:pos x="connsiteX0" y="connsiteY0"/>
-              </a:cxn>
-              <a:cxn ang="0">
-                <a:pos x="connsiteX1" y="connsiteY1"/>
-              </a:cxn>
-              <a:cxn ang="0">
-                <a:pos x="connsiteX2" y="connsiteY2"/>
-              </a:cxn>
-            </a:cxnLst>
-            <a:rect l="l" t="t" r="r" b="b"/>
-            <a:pathLst>
-              <a:path w="1127982" h="1014517">
-                <a:moveTo>
-                  <a:pt x="1127982" y="0"/>
-                </a:moveTo>
-                <a:lnTo>
-                  <a:pt x="0" y="0"/>
-                </a:lnTo>
-                <a:lnTo>
-                  <a:pt x="0" y="1014517"/>
-                </a:lnTo>
-              </a:path>
-            </a:pathLst>
-          </a:custGeom>
-          <a:ln w="28575">
-            <a:solidFill>
-              <a:schemeClr val="tx1"/>
-            </a:solidFill>
-            <a:headEnd type="arrow" w="med" len="med"/>
-            <a:tailEnd type="none" w="med" len="med"/>
-          </a:ln>
-        </p:spPr>
-        <p:style>
-          <a:lnRef idx="1">
-            <a:schemeClr val="accent1"/>
-          </a:lnRef>
-          <a:fillRef idx="0">
-            <a:schemeClr val="accent1"/>
-          </a:fillRef>
-          <a:effectRef idx="0">
-            <a:schemeClr val="accent1"/>
-          </a:effectRef>
-          <a:fontRef idx="minor">
-            <a:schemeClr val="tx1"/>
-          </a:fontRef>
-        </p:style>
-        <p:txBody>
-          <a:bodyPr rtlCol="0" anchor="ctr"/>
-          <a:lstStyle/>
-          <a:p>
-            <a:pPr algn="ctr"/>
-            <a:endParaRPr lang="ko-KR" altLang="en-US"/>
-          </a:p>
-        </p:txBody>
-      </p:sp>
-      <p:sp>
-        <p:nvSpPr>
-          <p:cNvPr id="20" name="자유형 19"/>
-          <p:cNvSpPr/>
-          <p:nvPr/>
-        </p:nvSpPr>
-        <p:spPr>
-          <a:xfrm flipV="1">
-            <a:off x="2051720" y="3579862"/>
-            <a:ext cx="1368152" cy="612068"/>
-          </a:xfrm>
-          <a:custGeom>
-            <a:avLst/>
-            <a:gdLst>
-              <a:gd name="connsiteX0" fmla="*/ 1127982 w 1127982"/>
-              <a:gd name="connsiteY0" fmla="*/ 0 h 1014517"/>
-              <a:gd name="connsiteX1" fmla="*/ 0 w 1127982"/>
-              <a:gd name="connsiteY1" fmla="*/ 0 h 1014517"/>
-              <a:gd name="connsiteX2" fmla="*/ 0 w 1127982"/>
-              <a:gd name="connsiteY2" fmla="*/ 1014517 h 1014517"/>
-            </a:gdLst>
-            <a:ahLst/>
-            <a:cxnLst>
-              <a:cxn ang="0">
-                <a:pos x="connsiteX0" y="connsiteY0"/>
-              </a:cxn>
-              <a:cxn ang="0">
-                <a:pos x="connsiteX1" y="connsiteY1"/>
-              </a:cxn>
-              <a:cxn ang="0">
-                <a:pos x="connsiteX2" y="connsiteY2"/>
-              </a:cxn>
-            </a:cxnLst>
-            <a:rect l="l" t="t" r="r" b="b"/>
-            <a:pathLst>
-              <a:path w="1127982" h="1014517">
-                <a:moveTo>
-                  <a:pt x="1127982" y="0"/>
-                </a:moveTo>
-                <a:lnTo>
-                  <a:pt x="0" y="0"/>
-                </a:lnTo>
-                <a:lnTo>
-                  <a:pt x="0" y="1014517"/>
-                </a:lnTo>
-              </a:path>
-            </a:pathLst>
-          </a:custGeom>
-          <a:ln w="28575">
-            <a:solidFill>
-              <a:schemeClr val="tx1"/>
-            </a:solidFill>
-            <a:headEnd type="none" w="med" len="med"/>
-            <a:tailEnd type="arrow" w="med" len="med"/>
-          </a:ln>
-        </p:spPr>
-        <p:style>
-          <a:lnRef idx="1">
-            <a:schemeClr val="accent1"/>
-          </a:lnRef>
-          <a:fillRef idx="0">
-            <a:schemeClr val="accent1"/>
-          </a:fillRef>
-          <a:effectRef idx="0">
-            <a:schemeClr val="accent1"/>
-          </a:effectRef>
-          <a:fontRef idx="minor">
-            <a:schemeClr val="tx1"/>
-          </a:fontRef>
-        </p:style>
-        <p:txBody>
-          <a:bodyPr rtlCol="0" anchor="ctr"/>
-          <a:lstStyle/>
-          <a:p>
-            <a:pPr algn="ctr"/>
-            <a:endParaRPr lang="ko-KR" altLang="en-US"/>
-          </a:p>
-        </p:txBody>
-      </p:sp>
-      <p:sp>
-        <p:nvSpPr>
-          <p:cNvPr id="24" name="모서리가 둥근 직사각형 23"/>
-          <p:cNvSpPr/>
-          <p:nvPr/>
-        </p:nvSpPr>
-        <p:spPr>
-          <a:xfrm>
-            <a:off x="1691680" y="3848794"/>
-            <a:ext cx="2082441" cy="307132"/>
-          </a:xfrm>
-          <a:prstGeom prst="roundRect">
-            <a:avLst>
-              <a:gd name="adj" fmla="val 18148"/>
-            </a:avLst>
-          </a:prstGeom>
-          <a:noFill/>
-          <a:ln>
-            <a:noFill/>
-          </a:ln>
-        </p:spPr>
-        <p:style>
-          <a:lnRef idx="2">
-            <a:schemeClr val="dk1"/>
-          </a:lnRef>
-          <a:fillRef idx="1">
-            <a:schemeClr val="lt1"/>
-          </a:fillRef>
-          <a:effectRef idx="0">
-            <a:schemeClr val="dk1"/>
-          </a:effectRef>
-          <a:fontRef idx="minor">
-            <a:schemeClr val="dk1"/>
-          </a:fontRef>
-        </p:style>
-        <p:txBody>
-          <a:bodyPr rtlCol="0" anchor="ctr"/>
-          <a:lstStyle/>
-          <a:p>
-            <a:pPr algn="ctr"/>
-            <a:r>
-              <a:rPr lang="en-US" altLang="ko-KR" sz="1400" b="1" dirty="0" smtClean="0"/>
-              <a:t>Event</a:t>
-            </a:r>
-            <a:endParaRPr lang="en-US" altLang="ko-KR" sz="1400" b="1" dirty="0" smtClean="0"/>
-          </a:p>
-        </p:txBody>
-      </p:sp>
-      <p:sp>
-        <p:nvSpPr>
-          <p:cNvPr id="25" name="모서리가 둥근 직사각형 24"/>
-          <p:cNvSpPr/>
-          <p:nvPr/>
-        </p:nvSpPr>
-        <p:spPr>
-          <a:xfrm>
-            <a:off x="1691680" y="1961778"/>
-            <a:ext cx="2082441" cy="307132"/>
-          </a:xfrm>
-          <a:prstGeom prst="roundRect">
-            <a:avLst>
-              <a:gd name="adj" fmla="val 18148"/>
-            </a:avLst>
-          </a:prstGeom>
-          <a:noFill/>
-          <a:ln>
-            <a:noFill/>
-          </a:ln>
-        </p:spPr>
-        <p:style>
-          <a:lnRef idx="2">
-            <a:schemeClr val="dk1"/>
-          </a:lnRef>
-          <a:fillRef idx="1">
-            <a:schemeClr val="lt1"/>
-          </a:fillRef>
-          <a:effectRef idx="0">
-            <a:schemeClr val="dk1"/>
-          </a:effectRef>
-          <a:fontRef idx="minor">
-            <a:schemeClr val="dk1"/>
-          </a:fontRef>
-        </p:style>
-        <p:txBody>
-          <a:bodyPr rtlCol="0" anchor="ctr"/>
-          <a:lstStyle/>
-          <a:p>
-            <a:pPr algn="ctr"/>
-            <a:r>
-              <a:rPr lang="en-US" altLang="ko-KR" sz="1400" b="1" dirty="0" smtClean="0"/>
               <a:t>Update UI</a:t>
             </a:r>
-            <a:endParaRPr lang="en-US" altLang="ko-KR" sz="1400" b="1" dirty="0" smtClean="0"/>
           </a:p>
         </p:txBody>
       </p:sp>

</xml_diff>